<commit_message>
Fill in some gaps
</commit_message>
<xml_diff>
--- a/video/Video.pptx
+++ b/video/Video.pptx
@@ -5,24 +5,26 @@
     <p:sldMasterId id="2147483648" r:id="rId1"/>
   </p:sldMasterIdLst>
   <p:sldIdLst>
-    <p:sldId id="256" r:id="rId2"/>
+    <p:sldId id="277" r:id="rId2"/>
     <p:sldId id="257" r:id="rId3"/>
     <p:sldId id="269" r:id="rId4"/>
-    <p:sldId id="258" r:id="rId5"/>
-    <p:sldId id="259" r:id="rId6"/>
-    <p:sldId id="270" r:id="rId7"/>
-    <p:sldId id="260" r:id="rId8"/>
-    <p:sldId id="261" r:id="rId9"/>
-    <p:sldId id="262" r:id="rId10"/>
-    <p:sldId id="263" r:id="rId11"/>
-    <p:sldId id="264" r:id="rId12"/>
-    <p:sldId id="272" r:id="rId13"/>
-    <p:sldId id="273" r:id="rId14"/>
-    <p:sldId id="274" r:id="rId15"/>
-    <p:sldId id="266" r:id="rId16"/>
-    <p:sldId id="267" r:id="rId17"/>
-    <p:sldId id="271" r:id="rId18"/>
-    <p:sldId id="268" r:id="rId19"/>
+    <p:sldId id="275" r:id="rId5"/>
+    <p:sldId id="276" r:id="rId6"/>
+    <p:sldId id="258" r:id="rId7"/>
+    <p:sldId id="259" r:id="rId8"/>
+    <p:sldId id="270" r:id="rId9"/>
+    <p:sldId id="260" r:id="rId10"/>
+    <p:sldId id="261" r:id="rId11"/>
+    <p:sldId id="262" r:id="rId12"/>
+    <p:sldId id="263" r:id="rId13"/>
+    <p:sldId id="264" r:id="rId14"/>
+    <p:sldId id="272" r:id="rId15"/>
+    <p:sldId id="273" r:id="rId16"/>
+    <p:sldId id="274" r:id="rId17"/>
+    <p:sldId id="266" r:id="rId18"/>
+    <p:sldId id="267" r:id="rId19"/>
+    <p:sldId id="271" r:id="rId20"/>
+    <p:sldId id="268" r:id="rId21"/>
   </p:sldIdLst>
   <p:sldSz cx="12192000" cy="6858000"/>
   <p:notesSz cx="6858000" cy="9144000"/>
@@ -121,6 +123,11 @@
       </a:defRPr>
     </a:lvl9pPr>
   </p:defaultTextStyle>
+  <p:extLst>
+    <p:ext uri="{EFAFB233-063F-42B5-8137-9DF3F51BA10A}">
+      <p15:sldGuideLst xmlns:p15="http://schemas.microsoft.com/office/powerpoint/2012/main"/>
+    </p:ext>
+  </p:extLst>
 </p:presentation>
 </file>
 
@@ -3361,36 +3368,79 @@
       </p:grpSpPr>
       <p:sp>
         <p:nvSpPr>
-          <p:cNvPr id="4" name="TextBox 3">
-            <a:extLst>
-              <a:ext uri="{FF2B5EF4-FFF2-40B4-BE49-F238E27FC236}">
-                <a16:creationId xmlns:a16="http://schemas.microsoft.com/office/drawing/2014/main" id="{8A33E395-4222-4291-1E95-93A502F66925}"/>
-              </a:ext>
-            </a:extLst>
-          </p:cNvPr>
-          <p:cNvSpPr txBox="1"/>
-          <p:nvPr/>
+          <p:cNvPr id="2" name="Title 1">
+            <a:extLst>
+              <a:ext uri="{FF2B5EF4-FFF2-40B4-BE49-F238E27FC236}">
+                <a16:creationId xmlns:a16="http://schemas.microsoft.com/office/drawing/2014/main" id="{2345480E-68D1-F4EC-A8E6-AD1ABEE52787}"/>
+              </a:ext>
+            </a:extLst>
+          </p:cNvPr>
+          <p:cNvSpPr>
+            <a:spLocks noGrp="1"/>
+          </p:cNvSpPr>
+          <p:nvPr>
+            <p:ph type="ctrTitle"/>
+          </p:nvPr>
         </p:nvSpPr>
         <p:spPr>
           <a:xfrm>
-            <a:off x="3688556" y="2865065"/>
-            <a:ext cx="4814887" cy="369332"/>
-          </a:xfrm>
-          <a:prstGeom prst="rect">
-            <a:avLst/>
-          </a:prstGeom>
-          <a:noFill/>
+            <a:off x="1524000" y="2056934"/>
+            <a:ext cx="9144000" cy="2387600"/>
+          </a:xfrm>
         </p:spPr>
         <p:txBody>
-          <a:bodyPr wrap="square" rtlCol="0">
-            <a:spAutoFit/>
+          <a:bodyPr>
+            <a:normAutofit fontScale="90000"/>
           </a:bodyPr>
           <a:lstStyle/>
           <a:p>
-            <a:pPr algn="ctr"/>
-            <a:r>
-              <a:rPr lang="de-DE" dirty="0"/>
-              <a:t>Titelfolie</a:t>
+            <a:pPr>
+              <a:lnSpc>
+                <a:spcPct val="150000"/>
+              </a:lnSpc>
+            </a:pPr>
+            <a:r>
+              <a:rPr lang="de-DE" dirty="0">
+                <a:latin typeface="Cavolini" panose="03000502040302020204" pitchFamily="66" charset="0"/>
+                <a:cs typeface="Cavolini" panose="03000502040302020204" pitchFamily="66" charset="0"/>
+              </a:rPr>
+              <a:t>Datenmanagement &amp; Archivierung im Umfeld der Forschung </a:t>
+            </a:r>
+          </a:p>
+        </p:txBody>
+      </p:sp>
+      <p:sp>
+        <p:nvSpPr>
+          <p:cNvPr id="3" name="Subtitle 2">
+            <a:extLst>
+              <a:ext uri="{FF2B5EF4-FFF2-40B4-BE49-F238E27FC236}">
+                <a16:creationId xmlns:a16="http://schemas.microsoft.com/office/drawing/2014/main" id="{3D14F605-5FD9-FAE3-397E-0739DA967D3F}"/>
+              </a:ext>
+            </a:extLst>
+          </p:cNvPr>
+          <p:cNvSpPr>
+            <a:spLocks noGrp="1"/>
+          </p:cNvSpPr>
+          <p:nvPr>
+            <p:ph type="subTitle" idx="1"/>
+          </p:nvPr>
+        </p:nvSpPr>
+        <p:spPr>
+          <a:xfrm>
+            <a:off x="1524000" y="4536609"/>
+            <a:ext cx="9144000" cy="1655762"/>
+          </a:xfrm>
+        </p:spPr>
+        <p:txBody>
+          <a:bodyPr anchor="ctr"/>
+          <a:lstStyle/>
+          <a:p>
+            <a:r>
+              <a:rPr lang="de-DE" dirty="0">
+                <a:latin typeface="Cavolini" panose="03000502040302020204" pitchFamily="66" charset="0"/>
+                <a:cs typeface="Cavolini" panose="03000502040302020204" pitchFamily="66" charset="0"/>
+              </a:rPr>
+              <a:t>1. Semester 2022 – Data Project - TEAM C</a:t>
             </a:r>
           </a:p>
         </p:txBody>
@@ -3398,7 +3448,7 @@
     </p:spTree>
     <p:extLst>
       <p:ext uri="{BB962C8B-B14F-4D97-AF65-F5344CB8AC3E}">
-        <p14:creationId xmlns:p14="http://schemas.microsoft.com/office/powerpoint/2010/main" val="1797466480"/>
+        <p14:creationId xmlns:p14="http://schemas.microsoft.com/office/powerpoint/2010/main" val="1750785970"/>
       </p:ext>
     </p:extLst>
   </p:cSld>
@@ -3409,6 +3459,922 @@
 </file>
 
 <file path=ppt/slides/slide10.xml><?xml version="1.0" encoding="utf-8"?>
+<p:sld xmlns:a="http://schemas.openxmlformats.org/drawingml/2006/main" xmlns:r="http://schemas.openxmlformats.org/officeDocument/2006/relationships" xmlns:p="http://schemas.openxmlformats.org/presentationml/2006/main">
+  <p:cSld>
+    <p:spTree>
+      <p:nvGrpSpPr>
+        <p:cNvPr id="1" name=""/>
+        <p:cNvGrpSpPr/>
+        <p:nvPr/>
+      </p:nvGrpSpPr>
+      <p:grpSpPr>
+        <a:xfrm>
+          <a:off x="0" y="0"/>
+          <a:ext cx="0" cy="0"/>
+          <a:chOff x="0" y="0"/>
+          <a:chExt cx="0" cy="0"/>
+        </a:xfrm>
+      </p:grpSpPr>
+      <p:sp>
+        <p:nvSpPr>
+          <p:cNvPr id="4" name="TextBox 3">
+            <a:extLst>
+              <a:ext uri="{FF2B5EF4-FFF2-40B4-BE49-F238E27FC236}">
+                <a16:creationId xmlns:a16="http://schemas.microsoft.com/office/drawing/2014/main" id="{8A33E395-4222-4291-1E95-93A502F66925}"/>
+              </a:ext>
+            </a:extLst>
+          </p:cNvPr>
+          <p:cNvSpPr txBox="1"/>
+          <p:nvPr/>
+        </p:nvSpPr>
+        <p:spPr>
+          <a:xfrm>
+            <a:off x="3688556" y="323570"/>
+            <a:ext cx="4814887" cy="369332"/>
+          </a:xfrm>
+          <a:prstGeom prst="rect">
+            <a:avLst/>
+          </a:prstGeom>
+          <a:noFill/>
+        </p:spPr>
+        <p:txBody>
+          <a:bodyPr wrap="square" rtlCol="0">
+            <a:spAutoFit/>
+          </a:bodyPr>
+          <a:lstStyle/>
+          <a:p>
+            <a:pPr algn="ctr"/>
+            <a:r>
+              <a:rPr lang="de-DE" dirty="0"/>
+              <a:t>Vorstellung Lea</a:t>
+            </a:r>
+          </a:p>
+        </p:txBody>
+      </p:sp>
+      <p:pic>
+        <p:nvPicPr>
+          <p:cNvPr id="9" name="Picture 8" descr="Icon&#10;&#10;Description automatically generated">
+            <a:extLst>
+              <a:ext uri="{FF2B5EF4-FFF2-40B4-BE49-F238E27FC236}">
+                <a16:creationId xmlns:a16="http://schemas.microsoft.com/office/drawing/2014/main" id="{9068B551-59E2-4997-1377-E1EC50E15BA0}"/>
+              </a:ext>
+            </a:extLst>
+          </p:cNvPr>
+          <p:cNvPicPr>
+            <a:picLocks noChangeAspect="1"/>
+          </p:cNvPicPr>
+          <p:nvPr/>
+        </p:nvPicPr>
+        <p:blipFill>
+          <a:blip r:embed="rId2"/>
+          <a:stretch>
+            <a:fillRect/>
+          </a:stretch>
+        </p:blipFill>
+        <p:spPr>
+          <a:xfrm>
+            <a:off x="9249239" y="3197879"/>
+            <a:ext cx="2075946" cy="3481762"/>
+          </a:xfrm>
+          <a:prstGeom prst="rect">
+            <a:avLst/>
+          </a:prstGeom>
+        </p:spPr>
+      </p:pic>
+      <p:pic>
+        <p:nvPicPr>
+          <p:cNvPr id="11" name="Picture 10">
+            <a:extLst>
+              <a:ext uri="{FF2B5EF4-FFF2-40B4-BE49-F238E27FC236}">
+                <a16:creationId xmlns:a16="http://schemas.microsoft.com/office/drawing/2014/main" id="{BB8A122F-D339-92D1-D65E-970D37172760}"/>
+              </a:ext>
+            </a:extLst>
+          </p:cNvPr>
+          <p:cNvPicPr>
+            <a:picLocks noChangeAspect="1"/>
+          </p:cNvPicPr>
+          <p:nvPr/>
+        </p:nvPicPr>
+        <p:blipFill>
+          <a:blip r:embed="rId3"/>
+          <a:stretch>
+            <a:fillRect/>
+          </a:stretch>
+        </p:blipFill>
+        <p:spPr>
+          <a:xfrm>
+            <a:off x="5003524" y="979114"/>
+            <a:ext cx="2103245" cy="4437529"/>
+          </a:xfrm>
+          <a:prstGeom prst="rect">
+            <a:avLst/>
+          </a:prstGeom>
+        </p:spPr>
+      </p:pic>
+      <p:sp>
+        <p:nvSpPr>
+          <p:cNvPr id="12" name="Oval Callout 11">
+            <a:extLst>
+              <a:ext uri="{FF2B5EF4-FFF2-40B4-BE49-F238E27FC236}">
+                <a16:creationId xmlns:a16="http://schemas.microsoft.com/office/drawing/2014/main" id="{EE6F1982-82B2-2A7F-2E32-ED8D40E5E3FF}"/>
+              </a:ext>
+            </a:extLst>
+          </p:cNvPr>
+          <p:cNvSpPr/>
+          <p:nvPr/>
+        </p:nvSpPr>
+        <p:spPr>
+          <a:xfrm>
+            <a:off x="7301125" y="742950"/>
+            <a:ext cx="2986087" cy="1464469"/>
+          </a:xfrm>
+          <a:prstGeom prst="wedgeEllipseCallout">
+            <a:avLst>
+              <a:gd name="adj1" fmla="val -45953"/>
+              <a:gd name="adj2" fmla="val 67866"/>
+            </a:avLst>
+          </a:prstGeom>
+          <a:solidFill>
+            <a:schemeClr val="bg1"/>
+          </a:solidFill>
+          <a:ln w="57150">
+            <a:solidFill>
+              <a:schemeClr val="tx1"/>
+            </a:solidFill>
+          </a:ln>
+        </p:spPr>
+        <p:style>
+          <a:lnRef idx="2">
+            <a:schemeClr val="accent1">
+              <a:shade val="50000"/>
+            </a:schemeClr>
+          </a:lnRef>
+          <a:fillRef idx="1">
+            <a:schemeClr val="accent1"/>
+          </a:fillRef>
+          <a:effectRef idx="0">
+            <a:schemeClr val="accent1"/>
+          </a:effectRef>
+          <a:fontRef idx="minor">
+            <a:schemeClr val="lt1"/>
+          </a:fontRef>
+        </p:style>
+        <p:txBody>
+          <a:bodyPr rtlCol="0" anchor="ctr"/>
+          <a:lstStyle/>
+          <a:p>
+            <a:pPr algn="ctr"/>
+            <a:r>
+              <a:rPr lang="de-DE" sz="3200" dirty="0">
+                <a:solidFill>
+                  <a:schemeClr val="tx1"/>
+                </a:solidFill>
+                <a:latin typeface="Cavolini" panose="03000502040302020204" pitchFamily="66" charset="0"/>
+                <a:cs typeface="Cavolini" panose="03000502040302020204" pitchFamily="66" charset="0"/>
+              </a:rPr>
+              <a:t>HI</a:t>
+            </a:r>
+          </a:p>
+        </p:txBody>
+      </p:sp>
+    </p:spTree>
+    <p:extLst>
+      <p:ext uri="{BB962C8B-B14F-4D97-AF65-F5344CB8AC3E}">
+        <p14:creationId xmlns:p14="http://schemas.microsoft.com/office/powerpoint/2010/main" val="2653906680"/>
+      </p:ext>
+    </p:extLst>
+  </p:cSld>
+  <p:clrMapOvr>
+    <a:masterClrMapping/>
+  </p:clrMapOvr>
+  <p:timing>
+    <p:tnLst>
+      <p:par>
+        <p:cTn id="1" dur="indefinite" restart="never" nodeType="tmRoot">
+          <p:childTnLst>
+            <p:seq concurrent="1" nextAc="seek">
+              <p:cTn id="2" dur="indefinite" nodeType="mainSeq">
+                <p:childTnLst>
+                  <p:par>
+                    <p:cTn id="3" fill="hold">
+                      <p:stCondLst>
+                        <p:cond delay="indefinite"/>
+                      </p:stCondLst>
+                      <p:childTnLst>
+                        <p:par>
+                          <p:cTn id="4" fill="hold">
+                            <p:stCondLst>
+                              <p:cond delay="0"/>
+                            </p:stCondLst>
+                            <p:childTnLst>
+                              <p:par>
+                                <p:cTn id="5" presetID="53" presetClass="entr" presetSubtype="16" fill="hold" grpId="0" nodeType="clickEffect">
+                                  <p:stCondLst>
+                                    <p:cond delay="0"/>
+                                  </p:stCondLst>
+                                  <p:childTnLst>
+                                    <p:set>
+                                      <p:cBhvr>
+                                        <p:cTn id="6" dur="1" fill="hold">
+                                          <p:stCondLst>
+                                            <p:cond delay="0"/>
+                                          </p:stCondLst>
+                                        </p:cTn>
+                                        <p:tgtEl>
+                                          <p:spTgt spid="12"/>
+                                        </p:tgtEl>
+                                        <p:attrNameLst>
+                                          <p:attrName>style.visibility</p:attrName>
+                                        </p:attrNameLst>
+                                      </p:cBhvr>
+                                      <p:to>
+                                        <p:strVal val="visible"/>
+                                      </p:to>
+                                    </p:set>
+                                    <p:anim calcmode="lin" valueType="num">
+                                      <p:cBhvr>
+                                        <p:cTn id="7" dur="500" fill="hold"/>
+                                        <p:tgtEl>
+                                          <p:spTgt spid="12"/>
+                                        </p:tgtEl>
+                                        <p:attrNameLst>
+                                          <p:attrName>ppt_w</p:attrName>
+                                        </p:attrNameLst>
+                                      </p:cBhvr>
+                                      <p:tavLst>
+                                        <p:tav tm="0">
+                                          <p:val>
+                                            <p:fltVal val="0"/>
+                                          </p:val>
+                                        </p:tav>
+                                        <p:tav tm="100000">
+                                          <p:val>
+                                            <p:strVal val="#ppt_w"/>
+                                          </p:val>
+                                        </p:tav>
+                                      </p:tavLst>
+                                    </p:anim>
+                                    <p:anim calcmode="lin" valueType="num">
+                                      <p:cBhvr>
+                                        <p:cTn id="8" dur="500" fill="hold"/>
+                                        <p:tgtEl>
+                                          <p:spTgt spid="12"/>
+                                        </p:tgtEl>
+                                        <p:attrNameLst>
+                                          <p:attrName>ppt_h</p:attrName>
+                                        </p:attrNameLst>
+                                      </p:cBhvr>
+                                      <p:tavLst>
+                                        <p:tav tm="0">
+                                          <p:val>
+                                            <p:fltVal val="0"/>
+                                          </p:val>
+                                        </p:tav>
+                                        <p:tav tm="100000">
+                                          <p:val>
+                                            <p:strVal val="#ppt_h"/>
+                                          </p:val>
+                                        </p:tav>
+                                      </p:tavLst>
+                                    </p:anim>
+                                    <p:animEffect transition="in" filter="fade">
+                                      <p:cBhvr>
+                                        <p:cTn id="9" dur="500"/>
+                                        <p:tgtEl>
+                                          <p:spTgt spid="12"/>
+                                        </p:tgtEl>
+                                      </p:cBhvr>
+                                    </p:animEffect>
+                                  </p:childTnLst>
+                                </p:cTn>
+                              </p:par>
+                            </p:childTnLst>
+                          </p:cTn>
+                        </p:par>
+                      </p:childTnLst>
+                    </p:cTn>
+                  </p:par>
+                </p:childTnLst>
+              </p:cTn>
+              <p:prevCondLst>
+                <p:cond evt="onPrev" delay="0">
+                  <p:tgtEl>
+                    <p:sldTgt/>
+                  </p:tgtEl>
+                </p:cond>
+              </p:prevCondLst>
+              <p:nextCondLst>
+                <p:cond evt="onNext" delay="0">
+                  <p:tgtEl>
+                    <p:sldTgt/>
+                  </p:tgtEl>
+                </p:cond>
+              </p:nextCondLst>
+            </p:seq>
+          </p:childTnLst>
+        </p:cTn>
+      </p:par>
+    </p:tnLst>
+    <p:bldLst>
+      <p:bldP spid="12" grpId="0" animBg="1"/>
+    </p:bldLst>
+  </p:timing>
+</p:sld>
+</file>
+
+<file path=ppt/slides/slide11.xml><?xml version="1.0" encoding="utf-8"?>
+<p:sld xmlns:a="http://schemas.openxmlformats.org/drawingml/2006/main" xmlns:r="http://schemas.openxmlformats.org/officeDocument/2006/relationships" xmlns:p="http://schemas.openxmlformats.org/presentationml/2006/main">
+  <p:cSld>
+    <p:spTree>
+      <p:nvGrpSpPr>
+        <p:cNvPr id="1" name=""/>
+        <p:cNvGrpSpPr/>
+        <p:nvPr/>
+      </p:nvGrpSpPr>
+      <p:grpSpPr>
+        <a:xfrm>
+          <a:off x="0" y="0"/>
+          <a:ext cx="0" cy="0"/>
+          <a:chOff x="0" y="0"/>
+          <a:chExt cx="0" cy="0"/>
+        </a:xfrm>
+      </p:grpSpPr>
+      <p:sp>
+        <p:nvSpPr>
+          <p:cNvPr id="4" name="TextBox 3">
+            <a:extLst>
+              <a:ext uri="{FF2B5EF4-FFF2-40B4-BE49-F238E27FC236}">
+                <a16:creationId xmlns:a16="http://schemas.microsoft.com/office/drawing/2014/main" id="{8A33E395-4222-4291-1E95-93A502F66925}"/>
+              </a:ext>
+            </a:extLst>
+          </p:cNvPr>
+          <p:cNvSpPr txBox="1"/>
+          <p:nvPr/>
+        </p:nvSpPr>
+        <p:spPr>
+          <a:xfrm>
+            <a:off x="3688556" y="323570"/>
+            <a:ext cx="4814887" cy="369332"/>
+          </a:xfrm>
+          <a:prstGeom prst="rect">
+            <a:avLst/>
+          </a:prstGeom>
+          <a:noFill/>
+        </p:spPr>
+        <p:txBody>
+          <a:bodyPr wrap="square" rtlCol="0">
+            <a:spAutoFit/>
+          </a:bodyPr>
+          <a:lstStyle/>
+          <a:p>
+            <a:pPr algn="ctr"/>
+            <a:r>
+              <a:rPr lang="de-DE" dirty="0"/>
+              <a:t>Datenmanagementplan</a:t>
+            </a:r>
+          </a:p>
+        </p:txBody>
+      </p:sp>
+      <p:pic>
+        <p:nvPicPr>
+          <p:cNvPr id="6" name="Picture 5" descr="Icon&#10;&#10;Description automatically generated">
+            <a:extLst>
+              <a:ext uri="{FF2B5EF4-FFF2-40B4-BE49-F238E27FC236}">
+                <a16:creationId xmlns:a16="http://schemas.microsoft.com/office/drawing/2014/main" id="{9184CE39-350E-DBAB-67CC-ABDD6868A55B}"/>
+              </a:ext>
+            </a:extLst>
+          </p:cNvPr>
+          <p:cNvPicPr>
+            <a:picLocks noChangeAspect="1"/>
+          </p:cNvPicPr>
+          <p:nvPr/>
+        </p:nvPicPr>
+        <p:blipFill>
+          <a:blip r:embed="rId2"/>
+          <a:stretch>
+            <a:fillRect/>
+          </a:stretch>
+        </p:blipFill>
+        <p:spPr>
+          <a:xfrm>
+            <a:off x="9249239" y="3197879"/>
+            <a:ext cx="2075946" cy="3481762"/>
+          </a:xfrm>
+          <a:prstGeom prst="rect">
+            <a:avLst/>
+          </a:prstGeom>
+        </p:spPr>
+      </p:pic>
+      <p:pic>
+        <p:nvPicPr>
+          <p:cNvPr id="7" name="Picture 6">
+            <a:extLst>
+              <a:ext uri="{FF2B5EF4-FFF2-40B4-BE49-F238E27FC236}">
+                <a16:creationId xmlns:a16="http://schemas.microsoft.com/office/drawing/2014/main" id="{EC0ADC01-E3E5-7310-7645-36804F758533}"/>
+              </a:ext>
+            </a:extLst>
+          </p:cNvPr>
+          <p:cNvPicPr>
+            <a:picLocks noChangeAspect="1"/>
+          </p:cNvPicPr>
+          <p:nvPr/>
+        </p:nvPicPr>
+        <p:blipFill>
+          <a:blip r:embed="rId3"/>
+          <a:stretch>
+            <a:fillRect/>
+          </a:stretch>
+        </p:blipFill>
+        <p:spPr>
+          <a:xfrm>
+            <a:off x="866815" y="3219566"/>
+            <a:ext cx="1629684" cy="3438387"/>
+          </a:xfrm>
+          <a:prstGeom prst="rect">
+            <a:avLst/>
+          </a:prstGeom>
+        </p:spPr>
+      </p:pic>
+      <p:pic>
+        <p:nvPicPr>
+          <p:cNvPr id="10" name="Picture 9" descr="Shape, square&#10;&#10;Description automatically generated">
+            <a:extLst>
+              <a:ext uri="{FF2B5EF4-FFF2-40B4-BE49-F238E27FC236}">
+                <a16:creationId xmlns:a16="http://schemas.microsoft.com/office/drawing/2014/main" id="{5B894B71-1D28-1D10-0F60-DCB8F8C3B6A4}"/>
+              </a:ext>
+            </a:extLst>
+          </p:cNvPr>
+          <p:cNvPicPr>
+            <a:picLocks noChangeAspect="1"/>
+          </p:cNvPicPr>
+          <p:nvPr/>
+        </p:nvPicPr>
+        <p:blipFill>
+          <a:blip r:embed="rId4"/>
+          <a:stretch>
+            <a:fillRect/>
+          </a:stretch>
+        </p:blipFill>
+        <p:spPr>
+          <a:xfrm>
+            <a:off x="4278426" y="1159431"/>
+            <a:ext cx="3879354" cy="4959904"/>
+          </a:xfrm>
+          <a:prstGeom prst="rect">
+            <a:avLst/>
+          </a:prstGeom>
+        </p:spPr>
+      </p:pic>
+      <p:sp>
+        <p:nvSpPr>
+          <p:cNvPr id="11" name="TextBox 10">
+            <a:extLst>
+              <a:ext uri="{FF2B5EF4-FFF2-40B4-BE49-F238E27FC236}">
+                <a16:creationId xmlns:a16="http://schemas.microsoft.com/office/drawing/2014/main" id="{B5C40031-C630-672A-E0AA-C39FB2531D02}"/>
+              </a:ext>
+            </a:extLst>
+          </p:cNvPr>
+          <p:cNvSpPr txBox="1"/>
+          <p:nvPr/>
+        </p:nvSpPr>
+        <p:spPr>
+          <a:xfrm>
+            <a:off x="4600574" y="1514474"/>
+            <a:ext cx="3178969" cy="954107"/>
+          </a:xfrm>
+          <a:prstGeom prst="rect">
+            <a:avLst/>
+          </a:prstGeom>
+          <a:noFill/>
+        </p:spPr>
+        <p:txBody>
+          <a:bodyPr wrap="square" rtlCol="0">
+            <a:spAutoFit/>
+          </a:bodyPr>
+          <a:lstStyle/>
+          <a:p>
+            <a:r>
+              <a:rPr lang="de-DE" sz="2800" dirty="0">
+                <a:latin typeface="Cavolini" panose="020B0604020202020204" pitchFamily="34" charset="0"/>
+                <a:cs typeface="Cavolini" panose="020B0604020202020204" pitchFamily="34" charset="0"/>
+              </a:rPr>
+              <a:t>Datenmanage-</a:t>
+            </a:r>
+            <a:r>
+              <a:rPr lang="de-DE" sz="2800" dirty="0" err="1">
+                <a:latin typeface="Cavolini" panose="020B0604020202020204" pitchFamily="34" charset="0"/>
+                <a:cs typeface="Cavolini" panose="020B0604020202020204" pitchFamily="34" charset="0"/>
+              </a:rPr>
+              <a:t>mentplan</a:t>
+            </a:r>
+            <a:endParaRPr lang="de-DE" sz="2800" dirty="0">
+              <a:latin typeface="Cavolini" panose="020B0604020202020204" pitchFamily="34" charset="0"/>
+              <a:cs typeface="Cavolini" panose="020B0604020202020204" pitchFamily="34" charset="0"/>
+            </a:endParaRPr>
+          </a:p>
+        </p:txBody>
+      </p:sp>
+      <p:sp>
+        <p:nvSpPr>
+          <p:cNvPr id="12" name="TextBox 11">
+            <a:extLst>
+              <a:ext uri="{FF2B5EF4-FFF2-40B4-BE49-F238E27FC236}">
+                <a16:creationId xmlns:a16="http://schemas.microsoft.com/office/drawing/2014/main" id="{2BB64B5D-C6B6-C951-C6AA-0B83943023D8}"/>
+              </a:ext>
+            </a:extLst>
+          </p:cNvPr>
+          <p:cNvSpPr txBox="1"/>
+          <p:nvPr/>
+        </p:nvSpPr>
+        <p:spPr>
+          <a:xfrm>
+            <a:off x="4640801" y="2823624"/>
+            <a:ext cx="2464136" cy="2787366"/>
+          </a:xfrm>
+          <a:prstGeom prst="rect">
+            <a:avLst/>
+          </a:prstGeom>
+          <a:noFill/>
+        </p:spPr>
+        <p:txBody>
+          <a:bodyPr wrap="none" rtlCol="0">
+            <a:spAutoFit/>
+          </a:bodyPr>
+          <a:lstStyle/>
+          <a:p>
+            <a:pPr marL="285750" indent="-285750">
+              <a:lnSpc>
+                <a:spcPct val="200000"/>
+              </a:lnSpc>
+              <a:buFontTx/>
+              <a:buChar char="-"/>
+            </a:pPr>
+            <a:r>
+              <a:rPr lang="de-DE" dirty="0">
+                <a:latin typeface="Cavolini" panose="020B0604020202020204" pitchFamily="34" charset="0"/>
+                <a:cs typeface="Cavolini" panose="020B0604020202020204" pitchFamily="34" charset="0"/>
+              </a:rPr>
+              <a:t>Durchführender</a:t>
+            </a:r>
+          </a:p>
+          <a:p>
+            <a:pPr marL="285750" indent="-285750">
+              <a:lnSpc>
+                <a:spcPct val="200000"/>
+              </a:lnSpc>
+              <a:buFontTx/>
+              <a:buChar char="-"/>
+            </a:pPr>
+            <a:r>
+              <a:rPr lang="de-DE" dirty="0">
+                <a:latin typeface="Cavolini" panose="020B0604020202020204" pitchFamily="34" charset="0"/>
+                <a:cs typeface="Cavolini" panose="020B0604020202020204" pitchFamily="34" charset="0"/>
+              </a:rPr>
+              <a:t>Name</a:t>
+            </a:r>
+          </a:p>
+          <a:p>
+            <a:pPr marL="285750" indent="-285750">
+              <a:lnSpc>
+                <a:spcPct val="200000"/>
+              </a:lnSpc>
+              <a:buFontTx/>
+              <a:buChar char="-"/>
+            </a:pPr>
+            <a:r>
+              <a:rPr lang="de-DE" dirty="0">
+                <a:latin typeface="Cavolini" panose="020B0604020202020204" pitchFamily="34" charset="0"/>
+                <a:cs typeface="Cavolini" panose="020B0604020202020204" pitchFamily="34" charset="0"/>
+              </a:rPr>
+              <a:t>Ziel</a:t>
+            </a:r>
+          </a:p>
+          <a:p>
+            <a:pPr marL="285750" indent="-285750">
+              <a:lnSpc>
+                <a:spcPct val="200000"/>
+              </a:lnSpc>
+              <a:buFontTx/>
+              <a:buChar char="-"/>
+            </a:pPr>
+            <a:r>
+              <a:rPr lang="de-DE" dirty="0">
+                <a:latin typeface="Cavolini" panose="020B0604020202020204" pitchFamily="34" charset="0"/>
+                <a:cs typeface="Cavolini" panose="020B0604020202020204" pitchFamily="34" charset="0"/>
+              </a:rPr>
+              <a:t>Datenquelle</a:t>
+            </a:r>
+          </a:p>
+          <a:p>
+            <a:pPr marL="285750" indent="-285750">
+              <a:lnSpc>
+                <a:spcPct val="200000"/>
+              </a:lnSpc>
+              <a:buFontTx/>
+              <a:buChar char="-"/>
+            </a:pPr>
+            <a:r>
+              <a:rPr lang="de-DE" dirty="0">
+                <a:latin typeface="Cavolini" panose="020B0604020202020204" pitchFamily="34" charset="0"/>
+                <a:cs typeface="Cavolini" panose="020B0604020202020204" pitchFamily="34" charset="0"/>
+              </a:rPr>
+              <a:t>Archivierung</a:t>
+            </a:r>
+          </a:p>
+        </p:txBody>
+      </p:sp>
+    </p:spTree>
+    <p:extLst>
+      <p:ext uri="{BB962C8B-B14F-4D97-AF65-F5344CB8AC3E}">
+        <p14:creationId xmlns:p14="http://schemas.microsoft.com/office/powerpoint/2010/main" val="1248021528"/>
+      </p:ext>
+    </p:extLst>
+  </p:cSld>
+  <p:clrMapOvr>
+    <a:masterClrMapping/>
+  </p:clrMapOvr>
+  <p:timing>
+    <p:tnLst>
+      <p:par>
+        <p:cTn id="1" dur="indefinite" restart="never" nodeType="tmRoot">
+          <p:childTnLst>
+            <p:seq concurrent="1" nextAc="seek">
+              <p:cTn id="2" dur="indefinite" nodeType="mainSeq">
+                <p:childTnLst>
+                  <p:par>
+                    <p:cTn id="3" fill="hold">
+                      <p:stCondLst>
+                        <p:cond delay="indefinite"/>
+                      </p:stCondLst>
+                      <p:childTnLst>
+                        <p:par>
+                          <p:cTn id="4" fill="hold">
+                            <p:stCondLst>
+                              <p:cond delay="0"/>
+                            </p:stCondLst>
+                            <p:childTnLst>
+                              <p:par>
+                                <p:cTn id="5" presetID="1" presetClass="entr" presetSubtype="0" fill="hold" grpId="0" nodeType="clickEffect">
+                                  <p:stCondLst>
+                                    <p:cond delay="0"/>
+                                  </p:stCondLst>
+                                  <p:childTnLst>
+                                    <p:set>
+                                      <p:cBhvr>
+                                        <p:cTn id="6" dur="1" fill="hold">
+                                          <p:stCondLst>
+                                            <p:cond delay="0"/>
+                                          </p:stCondLst>
+                                        </p:cTn>
+                                        <p:tgtEl>
+                                          <p:spTgt spid="12">
+                                            <p:txEl>
+                                              <p:pRg st="0" end="0"/>
+                                            </p:txEl>
+                                          </p:spTgt>
+                                        </p:tgtEl>
+                                        <p:attrNameLst>
+                                          <p:attrName>style.visibility</p:attrName>
+                                        </p:attrNameLst>
+                                      </p:cBhvr>
+                                      <p:to>
+                                        <p:strVal val="visible"/>
+                                      </p:to>
+                                    </p:set>
+                                  </p:childTnLst>
+                                </p:cTn>
+                              </p:par>
+                            </p:childTnLst>
+                          </p:cTn>
+                        </p:par>
+                      </p:childTnLst>
+                    </p:cTn>
+                  </p:par>
+                  <p:par>
+                    <p:cTn id="7" fill="hold">
+                      <p:stCondLst>
+                        <p:cond delay="indefinite"/>
+                      </p:stCondLst>
+                      <p:childTnLst>
+                        <p:par>
+                          <p:cTn id="8" fill="hold">
+                            <p:stCondLst>
+                              <p:cond delay="0"/>
+                            </p:stCondLst>
+                            <p:childTnLst>
+                              <p:par>
+                                <p:cTn id="9" presetID="1" presetClass="entr" presetSubtype="0" fill="hold" grpId="0" nodeType="clickEffect">
+                                  <p:stCondLst>
+                                    <p:cond delay="0"/>
+                                  </p:stCondLst>
+                                  <p:childTnLst>
+                                    <p:set>
+                                      <p:cBhvr>
+                                        <p:cTn id="10" dur="1" fill="hold">
+                                          <p:stCondLst>
+                                            <p:cond delay="0"/>
+                                          </p:stCondLst>
+                                        </p:cTn>
+                                        <p:tgtEl>
+                                          <p:spTgt spid="12">
+                                            <p:txEl>
+                                              <p:pRg st="1" end="1"/>
+                                            </p:txEl>
+                                          </p:spTgt>
+                                        </p:tgtEl>
+                                        <p:attrNameLst>
+                                          <p:attrName>style.visibility</p:attrName>
+                                        </p:attrNameLst>
+                                      </p:cBhvr>
+                                      <p:to>
+                                        <p:strVal val="visible"/>
+                                      </p:to>
+                                    </p:set>
+                                  </p:childTnLst>
+                                </p:cTn>
+                              </p:par>
+                            </p:childTnLst>
+                          </p:cTn>
+                        </p:par>
+                      </p:childTnLst>
+                    </p:cTn>
+                  </p:par>
+                  <p:par>
+                    <p:cTn id="11" fill="hold">
+                      <p:stCondLst>
+                        <p:cond delay="indefinite"/>
+                      </p:stCondLst>
+                      <p:childTnLst>
+                        <p:par>
+                          <p:cTn id="12" fill="hold">
+                            <p:stCondLst>
+                              <p:cond delay="0"/>
+                            </p:stCondLst>
+                            <p:childTnLst>
+                              <p:par>
+                                <p:cTn id="13" presetID="1" presetClass="entr" presetSubtype="0" fill="hold" grpId="0" nodeType="clickEffect">
+                                  <p:stCondLst>
+                                    <p:cond delay="0"/>
+                                  </p:stCondLst>
+                                  <p:childTnLst>
+                                    <p:set>
+                                      <p:cBhvr>
+                                        <p:cTn id="14" dur="1" fill="hold">
+                                          <p:stCondLst>
+                                            <p:cond delay="0"/>
+                                          </p:stCondLst>
+                                        </p:cTn>
+                                        <p:tgtEl>
+                                          <p:spTgt spid="12">
+                                            <p:txEl>
+                                              <p:pRg st="2" end="2"/>
+                                            </p:txEl>
+                                          </p:spTgt>
+                                        </p:tgtEl>
+                                        <p:attrNameLst>
+                                          <p:attrName>style.visibility</p:attrName>
+                                        </p:attrNameLst>
+                                      </p:cBhvr>
+                                      <p:to>
+                                        <p:strVal val="visible"/>
+                                      </p:to>
+                                    </p:set>
+                                  </p:childTnLst>
+                                </p:cTn>
+                              </p:par>
+                            </p:childTnLst>
+                          </p:cTn>
+                        </p:par>
+                      </p:childTnLst>
+                    </p:cTn>
+                  </p:par>
+                  <p:par>
+                    <p:cTn id="15" fill="hold">
+                      <p:stCondLst>
+                        <p:cond delay="indefinite"/>
+                      </p:stCondLst>
+                      <p:childTnLst>
+                        <p:par>
+                          <p:cTn id="16" fill="hold">
+                            <p:stCondLst>
+                              <p:cond delay="0"/>
+                            </p:stCondLst>
+                            <p:childTnLst>
+                              <p:par>
+                                <p:cTn id="17" presetID="1" presetClass="entr" presetSubtype="0" fill="hold" grpId="0" nodeType="clickEffect">
+                                  <p:stCondLst>
+                                    <p:cond delay="0"/>
+                                  </p:stCondLst>
+                                  <p:childTnLst>
+                                    <p:set>
+                                      <p:cBhvr>
+                                        <p:cTn id="18" dur="1" fill="hold">
+                                          <p:stCondLst>
+                                            <p:cond delay="0"/>
+                                          </p:stCondLst>
+                                        </p:cTn>
+                                        <p:tgtEl>
+                                          <p:spTgt spid="12">
+                                            <p:txEl>
+                                              <p:pRg st="3" end="3"/>
+                                            </p:txEl>
+                                          </p:spTgt>
+                                        </p:tgtEl>
+                                        <p:attrNameLst>
+                                          <p:attrName>style.visibility</p:attrName>
+                                        </p:attrNameLst>
+                                      </p:cBhvr>
+                                      <p:to>
+                                        <p:strVal val="visible"/>
+                                      </p:to>
+                                    </p:set>
+                                  </p:childTnLst>
+                                </p:cTn>
+                              </p:par>
+                            </p:childTnLst>
+                          </p:cTn>
+                        </p:par>
+                      </p:childTnLst>
+                    </p:cTn>
+                  </p:par>
+                  <p:par>
+                    <p:cTn id="19" fill="hold">
+                      <p:stCondLst>
+                        <p:cond delay="indefinite"/>
+                      </p:stCondLst>
+                      <p:childTnLst>
+                        <p:par>
+                          <p:cTn id="20" fill="hold">
+                            <p:stCondLst>
+                              <p:cond delay="0"/>
+                            </p:stCondLst>
+                            <p:childTnLst>
+                              <p:par>
+                                <p:cTn id="21" presetID="1" presetClass="entr" presetSubtype="0" fill="hold" grpId="0" nodeType="clickEffect">
+                                  <p:stCondLst>
+                                    <p:cond delay="0"/>
+                                  </p:stCondLst>
+                                  <p:childTnLst>
+                                    <p:set>
+                                      <p:cBhvr>
+                                        <p:cTn id="22" dur="1" fill="hold">
+                                          <p:stCondLst>
+                                            <p:cond delay="0"/>
+                                          </p:stCondLst>
+                                        </p:cTn>
+                                        <p:tgtEl>
+                                          <p:spTgt spid="12">
+                                            <p:txEl>
+                                              <p:pRg st="4" end="4"/>
+                                            </p:txEl>
+                                          </p:spTgt>
+                                        </p:tgtEl>
+                                        <p:attrNameLst>
+                                          <p:attrName>style.visibility</p:attrName>
+                                        </p:attrNameLst>
+                                      </p:cBhvr>
+                                      <p:to>
+                                        <p:strVal val="visible"/>
+                                      </p:to>
+                                    </p:set>
+                                  </p:childTnLst>
+                                </p:cTn>
+                              </p:par>
+                            </p:childTnLst>
+                          </p:cTn>
+                        </p:par>
+                      </p:childTnLst>
+                    </p:cTn>
+                  </p:par>
+                </p:childTnLst>
+              </p:cTn>
+              <p:prevCondLst>
+                <p:cond evt="onPrev" delay="0">
+                  <p:tgtEl>
+                    <p:sldTgt/>
+                  </p:tgtEl>
+                </p:cond>
+              </p:prevCondLst>
+              <p:nextCondLst>
+                <p:cond evt="onNext" delay="0">
+                  <p:tgtEl>
+                    <p:sldTgt/>
+                  </p:tgtEl>
+                </p:cond>
+              </p:nextCondLst>
+            </p:seq>
+          </p:childTnLst>
+        </p:cTn>
+      </p:par>
+    </p:tnLst>
+    <p:bldLst>
+      <p:bldP spid="12" grpId="0" build="p"/>
+    </p:bldLst>
+  </p:timing>
+</p:sld>
+</file>
+
+<file path=ppt/slides/slide12.xml><?xml version="1.0" encoding="utf-8"?>
 <p:sld xmlns:a="http://schemas.openxmlformats.org/drawingml/2006/main" xmlns:r="http://schemas.openxmlformats.org/officeDocument/2006/relationships" xmlns:p="http://schemas.openxmlformats.org/presentationml/2006/main">
   <p:cSld>
     <p:spTree>
@@ -4265,7 +5231,7 @@
 </p:sld>
 </file>
 
-<file path=ppt/slides/slide11.xml><?xml version="1.0" encoding="utf-8"?>
+<file path=ppt/slides/slide13.xml><?xml version="1.0" encoding="utf-8"?>
 <p:sld xmlns:a="http://schemas.openxmlformats.org/drawingml/2006/main" xmlns:r="http://schemas.openxmlformats.org/officeDocument/2006/relationships" xmlns:p="http://schemas.openxmlformats.org/presentationml/2006/main">
   <p:cSld>
     <p:spTree>
@@ -4673,7 +5639,7 @@
 </p:sld>
 </file>
 
-<file path=ppt/slides/slide12.xml><?xml version="1.0" encoding="utf-8"?>
+<file path=ppt/slides/slide14.xml><?xml version="1.0" encoding="utf-8"?>
 <p:sld xmlns:a="http://schemas.openxmlformats.org/drawingml/2006/main" xmlns:r="http://schemas.openxmlformats.org/officeDocument/2006/relationships" xmlns:p="http://schemas.openxmlformats.org/presentationml/2006/main">
   <p:cSld>
     <p:spTree>
@@ -5111,7 +6077,7 @@
 </p:sld>
 </file>
 
-<file path=ppt/slides/slide13.xml><?xml version="1.0" encoding="utf-8"?>
+<file path=ppt/slides/slide15.xml><?xml version="1.0" encoding="utf-8"?>
 <p:sld xmlns:a="http://schemas.openxmlformats.org/drawingml/2006/main" xmlns:r="http://schemas.openxmlformats.org/officeDocument/2006/relationships" xmlns:p="http://schemas.openxmlformats.org/presentationml/2006/main">
   <p:cSld>
     <p:spTree>
@@ -5579,7 +6545,7 @@
 </p:sld>
 </file>
 
-<file path=ppt/slides/slide14.xml><?xml version="1.0" encoding="utf-8"?>
+<file path=ppt/slides/slide16.xml><?xml version="1.0" encoding="utf-8"?>
 <p:sld xmlns:a="http://schemas.openxmlformats.org/drawingml/2006/main" xmlns:r="http://schemas.openxmlformats.org/officeDocument/2006/relationships" xmlns:p="http://schemas.openxmlformats.org/presentationml/2006/main">
   <p:cSld>
     <p:spTree>
@@ -6077,379 +7043,6 @@
 </p:sld>
 </file>
 
-<file path=ppt/slides/slide15.xml><?xml version="1.0" encoding="utf-8"?>
-<p:sld xmlns:a="http://schemas.openxmlformats.org/drawingml/2006/main" xmlns:r="http://schemas.openxmlformats.org/officeDocument/2006/relationships" xmlns:p="http://schemas.openxmlformats.org/presentationml/2006/main">
-  <p:cSld>
-    <p:spTree>
-      <p:nvGrpSpPr>
-        <p:cNvPr id="1" name=""/>
-        <p:cNvGrpSpPr/>
-        <p:nvPr/>
-      </p:nvGrpSpPr>
-      <p:grpSpPr>
-        <a:xfrm>
-          <a:off x="0" y="0"/>
-          <a:ext cx="0" cy="0"/>
-          <a:chOff x="0" y="0"/>
-          <a:chExt cx="0" cy="0"/>
-        </a:xfrm>
-      </p:grpSpPr>
-      <p:sp>
-        <p:nvSpPr>
-          <p:cNvPr id="4" name="TextBox 3">
-            <a:extLst>
-              <a:ext uri="{FF2B5EF4-FFF2-40B4-BE49-F238E27FC236}">
-                <a16:creationId xmlns:a16="http://schemas.microsoft.com/office/drawing/2014/main" id="{8A33E395-4222-4291-1E95-93A502F66925}"/>
-              </a:ext>
-            </a:extLst>
-          </p:cNvPr>
-          <p:cNvSpPr txBox="1"/>
-          <p:nvPr/>
-        </p:nvSpPr>
-        <p:spPr>
-          <a:xfrm>
-            <a:off x="3688556" y="323570"/>
-            <a:ext cx="4814887" cy="369332"/>
-          </a:xfrm>
-          <a:prstGeom prst="rect">
-            <a:avLst/>
-          </a:prstGeom>
-          <a:noFill/>
-        </p:spPr>
-        <p:txBody>
-          <a:bodyPr wrap="square" rtlCol="0">
-            <a:spAutoFit/>
-          </a:bodyPr>
-          <a:lstStyle/>
-          <a:p>
-            <a:pPr algn="ctr"/>
-            <a:r>
-              <a:rPr lang="de-DE" dirty="0"/>
-              <a:t>Release </a:t>
-            </a:r>
-            <a:r>
-              <a:rPr lang="de-DE" dirty="0" err="1"/>
-              <a:t>management</a:t>
-            </a:r>
-            <a:endParaRPr lang="de-DE" dirty="0"/>
-          </a:p>
-        </p:txBody>
-      </p:sp>
-      <p:sp>
-        <p:nvSpPr>
-          <p:cNvPr id="6" name="Rectangle 5">
-            <a:extLst>
-              <a:ext uri="{FF2B5EF4-FFF2-40B4-BE49-F238E27FC236}">
-                <a16:creationId xmlns:a16="http://schemas.microsoft.com/office/drawing/2014/main" id="{81DFCAC2-E62B-D58B-FDFB-793EA861C102}"/>
-              </a:ext>
-            </a:extLst>
-          </p:cNvPr>
-          <p:cNvSpPr/>
-          <p:nvPr/>
-        </p:nvSpPr>
-        <p:spPr>
-          <a:xfrm>
-            <a:off x="4009463" y="5535326"/>
-            <a:ext cx="4173071" cy="779929"/>
-          </a:xfrm>
-          <a:prstGeom prst="rect">
-            <a:avLst/>
-          </a:prstGeom>
-        </p:spPr>
-        <p:style>
-          <a:lnRef idx="2">
-            <a:schemeClr val="accent1">
-              <a:shade val="50000"/>
-            </a:schemeClr>
-          </a:lnRef>
-          <a:fillRef idx="1">
-            <a:schemeClr val="accent1"/>
-          </a:fillRef>
-          <a:effectRef idx="0">
-            <a:schemeClr val="accent1"/>
-          </a:effectRef>
-          <a:fontRef idx="minor">
-            <a:schemeClr val="lt1"/>
-          </a:fontRef>
-        </p:style>
-        <p:txBody>
-          <a:bodyPr rtlCol="0" anchor="ctr"/>
-          <a:lstStyle/>
-          <a:p>
-            <a:pPr algn="ctr"/>
-            <a:r>
-              <a:rPr lang="de-DE" dirty="0"/>
-              <a:t>Logger</a:t>
-            </a:r>
-          </a:p>
-        </p:txBody>
-      </p:sp>
-      <p:sp>
-        <p:nvSpPr>
-          <p:cNvPr id="8" name="Rectangle 7">
-            <a:extLst>
-              <a:ext uri="{FF2B5EF4-FFF2-40B4-BE49-F238E27FC236}">
-                <a16:creationId xmlns:a16="http://schemas.microsoft.com/office/drawing/2014/main" id="{9E0F61B0-3211-AA3D-D86E-6D6B5432E7B3}"/>
-              </a:ext>
-            </a:extLst>
-          </p:cNvPr>
-          <p:cNvSpPr/>
-          <p:nvPr/>
-        </p:nvSpPr>
-        <p:spPr>
-          <a:xfrm>
-            <a:off x="4009463" y="1156067"/>
-            <a:ext cx="4173071" cy="2441021"/>
-          </a:xfrm>
-          <a:prstGeom prst="rect">
-            <a:avLst/>
-          </a:prstGeom>
-        </p:spPr>
-        <p:style>
-          <a:lnRef idx="2">
-            <a:schemeClr val="accent1">
-              <a:shade val="50000"/>
-            </a:schemeClr>
-          </a:lnRef>
-          <a:fillRef idx="1">
-            <a:schemeClr val="accent1"/>
-          </a:fillRef>
-          <a:effectRef idx="0">
-            <a:schemeClr val="accent1"/>
-          </a:effectRef>
-          <a:fontRef idx="minor">
-            <a:schemeClr val="lt1"/>
-          </a:fontRef>
-        </p:style>
-        <p:txBody>
-          <a:bodyPr rtlCol="0" anchor="ctr"/>
-          <a:lstStyle/>
-          <a:p>
-            <a:pPr algn="ctr"/>
-            <a:r>
-              <a:rPr lang="de-DE" dirty="0"/>
-              <a:t>GitHub Logs &amp; Releases zeigen</a:t>
-            </a:r>
-          </a:p>
-        </p:txBody>
-      </p:sp>
-      <p:pic>
-        <p:nvPicPr>
-          <p:cNvPr id="9" name="Picture 8" descr="Icon&#10;&#10;Description automatically generated">
-            <a:extLst>
-              <a:ext uri="{FF2B5EF4-FFF2-40B4-BE49-F238E27FC236}">
-                <a16:creationId xmlns:a16="http://schemas.microsoft.com/office/drawing/2014/main" id="{3D2B73C4-9172-E7B0-E4C0-BAA35F5C3004}"/>
-              </a:ext>
-            </a:extLst>
-          </p:cNvPr>
-          <p:cNvPicPr>
-            <a:picLocks noChangeAspect="1"/>
-          </p:cNvPicPr>
-          <p:nvPr/>
-        </p:nvPicPr>
-        <p:blipFill>
-          <a:blip r:embed="rId2"/>
-          <a:stretch>
-            <a:fillRect/>
-          </a:stretch>
-        </p:blipFill>
-        <p:spPr>
-          <a:xfrm>
-            <a:off x="9249239" y="3197879"/>
-            <a:ext cx="2075946" cy="3481762"/>
-          </a:xfrm>
-          <a:prstGeom prst="rect">
-            <a:avLst/>
-          </a:prstGeom>
-        </p:spPr>
-      </p:pic>
-      <p:pic>
-        <p:nvPicPr>
-          <p:cNvPr id="10" name="Picture 9">
-            <a:extLst>
-              <a:ext uri="{FF2B5EF4-FFF2-40B4-BE49-F238E27FC236}">
-                <a16:creationId xmlns:a16="http://schemas.microsoft.com/office/drawing/2014/main" id="{CB5CDBCD-DA5A-0116-894C-68E36A0E2020}"/>
-              </a:ext>
-            </a:extLst>
-          </p:cNvPr>
-          <p:cNvPicPr>
-            <a:picLocks noChangeAspect="1"/>
-          </p:cNvPicPr>
-          <p:nvPr/>
-        </p:nvPicPr>
-        <p:blipFill>
-          <a:blip r:embed="rId3"/>
-          <a:stretch>
-            <a:fillRect/>
-          </a:stretch>
-        </p:blipFill>
-        <p:spPr>
-          <a:xfrm>
-            <a:off x="866815" y="3219566"/>
-            <a:ext cx="1629684" cy="3438387"/>
-          </a:xfrm>
-          <a:prstGeom prst="rect">
-            <a:avLst/>
-          </a:prstGeom>
-        </p:spPr>
-      </p:pic>
-    </p:spTree>
-    <p:extLst>
-      <p:ext uri="{BB962C8B-B14F-4D97-AF65-F5344CB8AC3E}">
-        <p14:creationId xmlns:p14="http://schemas.microsoft.com/office/powerpoint/2010/main" val="1051760568"/>
-      </p:ext>
-    </p:extLst>
-  </p:cSld>
-  <p:clrMapOvr>
-    <a:masterClrMapping/>
-  </p:clrMapOvr>
-</p:sld>
-</file>
-
-<file path=ppt/slides/slide16.xml><?xml version="1.0" encoding="utf-8"?>
-<p:sld xmlns:a="http://schemas.openxmlformats.org/drawingml/2006/main" xmlns:r="http://schemas.openxmlformats.org/officeDocument/2006/relationships" xmlns:p="http://schemas.openxmlformats.org/presentationml/2006/main">
-  <p:cSld>
-    <p:spTree>
-      <p:nvGrpSpPr>
-        <p:cNvPr id="1" name=""/>
-        <p:cNvGrpSpPr/>
-        <p:nvPr/>
-      </p:nvGrpSpPr>
-      <p:grpSpPr>
-        <a:xfrm>
-          <a:off x="0" y="0"/>
-          <a:ext cx="0" cy="0"/>
-          <a:chOff x="0" y="0"/>
-          <a:chExt cx="0" cy="0"/>
-        </a:xfrm>
-      </p:grpSpPr>
-      <p:sp>
-        <p:nvSpPr>
-          <p:cNvPr id="4" name="TextBox 3">
-            <a:extLst>
-              <a:ext uri="{FF2B5EF4-FFF2-40B4-BE49-F238E27FC236}">
-                <a16:creationId xmlns:a16="http://schemas.microsoft.com/office/drawing/2014/main" id="{8A33E395-4222-4291-1E95-93A502F66925}"/>
-              </a:ext>
-            </a:extLst>
-          </p:cNvPr>
-          <p:cNvSpPr txBox="1"/>
-          <p:nvPr/>
-        </p:nvSpPr>
-        <p:spPr>
-          <a:xfrm>
-            <a:off x="3688556" y="323570"/>
-            <a:ext cx="4814887" cy="369332"/>
-          </a:xfrm>
-          <a:prstGeom prst="rect">
-            <a:avLst/>
-          </a:prstGeom>
-          <a:noFill/>
-        </p:spPr>
-        <p:txBody>
-          <a:bodyPr wrap="square" rtlCol="0">
-            <a:spAutoFit/>
-          </a:bodyPr>
-          <a:lstStyle/>
-          <a:p>
-            <a:pPr algn="ctr"/>
-            <a:r>
-              <a:rPr lang="de-DE" dirty="0"/>
-              <a:t>Ergebnispräsentation</a:t>
-            </a:r>
-          </a:p>
-        </p:txBody>
-      </p:sp>
-      <p:sp>
-        <p:nvSpPr>
-          <p:cNvPr id="2" name="Rectangle 1">
-            <a:extLst>
-              <a:ext uri="{FF2B5EF4-FFF2-40B4-BE49-F238E27FC236}">
-                <a16:creationId xmlns:a16="http://schemas.microsoft.com/office/drawing/2014/main" id="{91F1D3A9-4EF4-DF68-CB9E-943A8570F444}"/>
-              </a:ext>
-            </a:extLst>
-          </p:cNvPr>
-          <p:cNvSpPr/>
-          <p:nvPr/>
-        </p:nvSpPr>
-        <p:spPr>
-          <a:xfrm>
-            <a:off x="7158318" y="1808629"/>
-            <a:ext cx="2823882" cy="3072653"/>
-          </a:xfrm>
-          <a:prstGeom prst="rect">
-            <a:avLst/>
-          </a:prstGeom>
-        </p:spPr>
-        <p:style>
-          <a:lnRef idx="2">
-            <a:schemeClr val="accent1">
-              <a:shade val="50000"/>
-            </a:schemeClr>
-          </a:lnRef>
-          <a:fillRef idx="1">
-            <a:schemeClr val="accent1"/>
-          </a:fillRef>
-          <a:effectRef idx="0">
-            <a:schemeClr val="accent1"/>
-          </a:effectRef>
-          <a:fontRef idx="minor">
-            <a:schemeClr val="lt1"/>
-          </a:fontRef>
-        </p:style>
-        <p:txBody>
-          <a:bodyPr rtlCol="0" anchor="ctr"/>
-          <a:lstStyle/>
-          <a:p>
-            <a:pPr algn="ctr"/>
-            <a:r>
-              <a:rPr lang="de-DE" dirty="0"/>
-              <a:t>Ergebnisse</a:t>
-            </a:r>
-          </a:p>
-        </p:txBody>
-      </p:sp>
-      <p:pic>
-        <p:nvPicPr>
-          <p:cNvPr id="7" name="Picture 6">
-            <a:extLst>
-              <a:ext uri="{FF2B5EF4-FFF2-40B4-BE49-F238E27FC236}">
-                <a16:creationId xmlns:a16="http://schemas.microsoft.com/office/drawing/2014/main" id="{1F52C90B-5BF3-717D-81E9-265F99FAE81F}"/>
-              </a:ext>
-            </a:extLst>
-          </p:cNvPr>
-          <p:cNvPicPr>
-            <a:picLocks noChangeAspect="1"/>
-          </p:cNvPicPr>
-          <p:nvPr/>
-        </p:nvPicPr>
-        <p:blipFill>
-          <a:blip r:embed="rId2"/>
-          <a:srcRect/>
-          <a:stretch/>
-        </p:blipFill>
-        <p:spPr>
-          <a:xfrm>
-            <a:off x="2041615" y="1903776"/>
-            <a:ext cx="2075946" cy="3291467"/>
-          </a:xfrm>
-          <a:prstGeom prst="rect">
-            <a:avLst/>
-          </a:prstGeom>
-        </p:spPr>
-      </p:pic>
-    </p:spTree>
-    <p:extLst>
-      <p:ext uri="{BB962C8B-B14F-4D97-AF65-F5344CB8AC3E}">
-        <p14:creationId xmlns:p14="http://schemas.microsoft.com/office/powerpoint/2010/main" val="2336442013"/>
-      </p:ext>
-    </p:extLst>
-  </p:cSld>
-  <p:clrMapOvr>
-    <a:masterClrMapping/>
-  </p:clrMapOvr>
-</p:sld>
-</file>
-
 <file path=ppt/slides/slide17.xml><?xml version="1.0" encoding="utf-8"?>
 <p:sld xmlns:a="http://schemas.openxmlformats.org/drawingml/2006/main" xmlns:r="http://schemas.openxmlformats.org/officeDocument/2006/relationships" xmlns:p="http://schemas.openxmlformats.org/presentationml/2006/main">
   <p:cSld>
@@ -6498,17 +7091,71 @@
             <a:pPr algn="ctr"/>
             <a:r>
               <a:rPr lang="de-DE" dirty="0"/>
-              <a:t>Ergebnispräsentation</a:t>
+              <a:t>Release </a:t>
+            </a:r>
+            <a:r>
+              <a:rPr lang="de-DE" dirty="0" err="1"/>
+              <a:t>management</a:t>
+            </a:r>
+            <a:endParaRPr lang="de-DE" dirty="0"/>
+          </a:p>
+        </p:txBody>
+      </p:sp>
+      <p:sp>
+        <p:nvSpPr>
+          <p:cNvPr id="8" name="Rectangle 7">
+            <a:extLst>
+              <a:ext uri="{FF2B5EF4-FFF2-40B4-BE49-F238E27FC236}">
+                <a16:creationId xmlns:a16="http://schemas.microsoft.com/office/drawing/2014/main" id="{9E0F61B0-3211-AA3D-D86E-6D6B5432E7B3}"/>
+              </a:ext>
+            </a:extLst>
+          </p:cNvPr>
+          <p:cNvSpPr/>
+          <p:nvPr/>
+        </p:nvSpPr>
+        <p:spPr>
+          <a:xfrm>
+            <a:off x="4009463" y="1156067"/>
+            <a:ext cx="4173071" cy="2441021"/>
+          </a:xfrm>
+          <a:prstGeom prst="rect">
+            <a:avLst/>
+          </a:prstGeom>
+        </p:spPr>
+        <p:style>
+          <a:lnRef idx="2">
+            <a:schemeClr val="accent1">
+              <a:shade val="50000"/>
+            </a:schemeClr>
+          </a:lnRef>
+          <a:fillRef idx="1">
+            <a:schemeClr val="accent1"/>
+          </a:fillRef>
+          <a:effectRef idx="0">
+            <a:schemeClr val="accent1"/>
+          </a:effectRef>
+          <a:fontRef idx="minor">
+            <a:schemeClr val="lt1"/>
+          </a:fontRef>
+        </p:style>
+        <p:txBody>
+          <a:bodyPr rtlCol="0" anchor="ctr"/>
+          <a:lstStyle/>
+          <a:p>
+            <a:pPr algn="ctr"/>
+            <a:r>
+              <a:rPr lang="de-DE" dirty="0"/>
+              <a:t>GitHub Logs &amp; Releases zeigen</a:t>
             </a:r>
           </a:p>
         </p:txBody>
       </p:sp>
       <p:pic>
         <p:nvPicPr>
-          <p:cNvPr id="7" name="Picture 6">
-            <a:extLst>
-              <a:ext uri="{FF2B5EF4-FFF2-40B4-BE49-F238E27FC236}">
-                <a16:creationId xmlns:a16="http://schemas.microsoft.com/office/drawing/2014/main" id="{1F52C90B-5BF3-717D-81E9-265F99FAE81F}"/>
+          <p:cNvPr id="9" name="Picture 8" descr="Icon&#10;&#10;Description automatically generated">
+            <a:extLst>
+              <a:ext uri="{FF2B5EF4-FFF2-40B4-BE49-F238E27FC236}">
+                <a16:creationId xmlns:a16="http://schemas.microsoft.com/office/drawing/2014/main" id="{3D2B73C4-9172-E7B0-E4C0-BAA35F5C3004}"/>
               </a:ext>
             </a:extLst>
           </p:cNvPr>
@@ -6519,13 +7166,44 @@
         </p:nvPicPr>
         <p:blipFill>
           <a:blip r:embed="rId2"/>
-          <a:srcRect/>
-          <a:stretch/>
+          <a:stretch>
+            <a:fillRect/>
+          </a:stretch>
         </p:blipFill>
         <p:spPr>
           <a:xfrm>
-            <a:off x="4865599" y="1621631"/>
-            <a:ext cx="2460802" cy="3087187"/>
+            <a:off x="9249239" y="3197879"/>
+            <a:ext cx="2075946" cy="3481762"/>
+          </a:xfrm>
+          <a:prstGeom prst="rect">
+            <a:avLst/>
+          </a:prstGeom>
+        </p:spPr>
+      </p:pic>
+      <p:pic>
+        <p:nvPicPr>
+          <p:cNvPr id="10" name="Picture 9">
+            <a:extLst>
+              <a:ext uri="{FF2B5EF4-FFF2-40B4-BE49-F238E27FC236}">
+                <a16:creationId xmlns:a16="http://schemas.microsoft.com/office/drawing/2014/main" id="{CB5CDBCD-DA5A-0116-894C-68E36A0E2020}"/>
+              </a:ext>
+            </a:extLst>
+          </p:cNvPr>
+          <p:cNvPicPr>
+            <a:picLocks noChangeAspect="1"/>
+          </p:cNvPicPr>
+          <p:nvPr/>
+        </p:nvPicPr>
+        <p:blipFill>
+          <a:blip r:embed="rId3"/>
+          <a:stretch>
+            <a:fillRect/>
+          </a:stretch>
+        </p:blipFill>
+        <p:spPr>
+          <a:xfrm>
+            <a:off x="866815" y="3219566"/>
+            <a:ext cx="1629684" cy="3438387"/>
           </a:xfrm>
           <a:prstGeom prst="rect">
             <a:avLst/>
@@ -6535,7 +7213,7 @@
     </p:spTree>
     <p:extLst>
       <p:ext uri="{BB962C8B-B14F-4D97-AF65-F5344CB8AC3E}">
-        <p14:creationId xmlns:p14="http://schemas.microsoft.com/office/powerpoint/2010/main" val="3562465252"/>
+        <p14:creationId xmlns:p14="http://schemas.microsoft.com/office/powerpoint/2010/main" val="1051760568"/>
       </p:ext>
     </p:extLst>
   </p:cSld>
@@ -6576,7 +7254,7 @@
         </p:nvSpPr>
         <p:spPr>
           <a:xfrm>
-            <a:off x="3688556" y="2865065"/>
+            <a:off x="3688556" y="323570"/>
             <a:ext cx="4814887" cy="369332"/>
           </a:xfrm>
           <a:prstGeom prst="rect">
@@ -6593,20 +7271,188 @@
             <a:pPr algn="ctr"/>
             <a:r>
               <a:rPr lang="de-DE" dirty="0"/>
-              <a:t>Abschluss, GitHub Link, </a:t>
-            </a:r>
-            <a:r>
-              <a:rPr lang="de-DE" dirty="0" err="1"/>
-              <a:t>etc</a:t>
-            </a:r>
-            <a:endParaRPr lang="de-DE" dirty="0"/>
+              <a:t>Ergebnispräsentation</a:t>
+            </a:r>
           </a:p>
         </p:txBody>
       </p:sp>
+      <p:sp>
+        <p:nvSpPr>
+          <p:cNvPr id="2" name="Rectangle 1">
+            <a:extLst>
+              <a:ext uri="{FF2B5EF4-FFF2-40B4-BE49-F238E27FC236}">
+                <a16:creationId xmlns:a16="http://schemas.microsoft.com/office/drawing/2014/main" id="{91F1D3A9-4EF4-DF68-CB9E-943A8570F444}"/>
+              </a:ext>
+            </a:extLst>
+          </p:cNvPr>
+          <p:cNvSpPr/>
+          <p:nvPr/>
+        </p:nvSpPr>
+        <p:spPr>
+          <a:xfrm>
+            <a:off x="7158318" y="1808629"/>
+            <a:ext cx="2823882" cy="3072653"/>
+          </a:xfrm>
+          <a:prstGeom prst="rect">
+            <a:avLst/>
+          </a:prstGeom>
+        </p:spPr>
+        <p:style>
+          <a:lnRef idx="2">
+            <a:schemeClr val="accent1">
+              <a:shade val="50000"/>
+            </a:schemeClr>
+          </a:lnRef>
+          <a:fillRef idx="1">
+            <a:schemeClr val="accent1"/>
+          </a:fillRef>
+          <a:effectRef idx="0">
+            <a:schemeClr val="accent1"/>
+          </a:effectRef>
+          <a:fontRef idx="minor">
+            <a:schemeClr val="lt1"/>
+          </a:fontRef>
+        </p:style>
+        <p:txBody>
+          <a:bodyPr rtlCol="0" anchor="ctr"/>
+          <a:lstStyle/>
+          <a:p>
+            <a:pPr algn="ctr"/>
+            <a:r>
+              <a:rPr lang="de-DE" dirty="0"/>
+              <a:t>Ergebnisse</a:t>
+            </a:r>
+          </a:p>
+        </p:txBody>
+      </p:sp>
+      <p:pic>
+        <p:nvPicPr>
+          <p:cNvPr id="7" name="Picture 6">
+            <a:extLst>
+              <a:ext uri="{FF2B5EF4-FFF2-40B4-BE49-F238E27FC236}">
+                <a16:creationId xmlns:a16="http://schemas.microsoft.com/office/drawing/2014/main" id="{1F52C90B-5BF3-717D-81E9-265F99FAE81F}"/>
+              </a:ext>
+            </a:extLst>
+          </p:cNvPr>
+          <p:cNvPicPr>
+            <a:picLocks noChangeAspect="1"/>
+          </p:cNvPicPr>
+          <p:nvPr/>
+        </p:nvPicPr>
+        <p:blipFill>
+          <a:blip r:embed="rId2"/>
+          <a:srcRect/>
+          <a:stretch/>
+        </p:blipFill>
+        <p:spPr>
+          <a:xfrm>
+            <a:off x="2041615" y="1903776"/>
+            <a:ext cx="2075946" cy="3291467"/>
+          </a:xfrm>
+          <a:prstGeom prst="rect">
+            <a:avLst/>
+          </a:prstGeom>
+        </p:spPr>
+      </p:pic>
     </p:spTree>
     <p:extLst>
       <p:ext uri="{BB962C8B-B14F-4D97-AF65-F5344CB8AC3E}">
-        <p14:creationId xmlns:p14="http://schemas.microsoft.com/office/powerpoint/2010/main" val="3577887946"/>
+        <p14:creationId xmlns:p14="http://schemas.microsoft.com/office/powerpoint/2010/main" val="2336442013"/>
+      </p:ext>
+    </p:extLst>
+  </p:cSld>
+  <p:clrMapOvr>
+    <a:masterClrMapping/>
+  </p:clrMapOvr>
+</p:sld>
+</file>
+
+<file path=ppt/slides/slide19.xml><?xml version="1.0" encoding="utf-8"?>
+<p:sld xmlns:a="http://schemas.openxmlformats.org/drawingml/2006/main" xmlns:r="http://schemas.openxmlformats.org/officeDocument/2006/relationships" xmlns:p="http://schemas.openxmlformats.org/presentationml/2006/main">
+  <p:cSld>
+    <p:spTree>
+      <p:nvGrpSpPr>
+        <p:cNvPr id="1" name=""/>
+        <p:cNvGrpSpPr/>
+        <p:nvPr/>
+      </p:nvGrpSpPr>
+      <p:grpSpPr>
+        <a:xfrm>
+          <a:off x="0" y="0"/>
+          <a:ext cx="0" cy="0"/>
+          <a:chOff x="0" y="0"/>
+          <a:chExt cx="0" cy="0"/>
+        </a:xfrm>
+      </p:grpSpPr>
+      <p:sp>
+        <p:nvSpPr>
+          <p:cNvPr id="4" name="TextBox 3">
+            <a:extLst>
+              <a:ext uri="{FF2B5EF4-FFF2-40B4-BE49-F238E27FC236}">
+                <a16:creationId xmlns:a16="http://schemas.microsoft.com/office/drawing/2014/main" id="{8A33E395-4222-4291-1E95-93A502F66925}"/>
+              </a:ext>
+            </a:extLst>
+          </p:cNvPr>
+          <p:cNvSpPr txBox="1"/>
+          <p:nvPr/>
+        </p:nvSpPr>
+        <p:spPr>
+          <a:xfrm>
+            <a:off x="3688556" y="323570"/>
+            <a:ext cx="4814887" cy="369332"/>
+          </a:xfrm>
+          <a:prstGeom prst="rect">
+            <a:avLst/>
+          </a:prstGeom>
+          <a:noFill/>
+        </p:spPr>
+        <p:txBody>
+          <a:bodyPr wrap="square" rtlCol="0">
+            <a:spAutoFit/>
+          </a:bodyPr>
+          <a:lstStyle/>
+          <a:p>
+            <a:pPr algn="ctr"/>
+            <a:r>
+              <a:rPr lang="de-DE" dirty="0"/>
+              <a:t>Ergebnispräsentation</a:t>
+            </a:r>
+          </a:p>
+        </p:txBody>
+      </p:sp>
+      <p:pic>
+        <p:nvPicPr>
+          <p:cNvPr id="7" name="Picture 6">
+            <a:extLst>
+              <a:ext uri="{FF2B5EF4-FFF2-40B4-BE49-F238E27FC236}">
+                <a16:creationId xmlns:a16="http://schemas.microsoft.com/office/drawing/2014/main" id="{1F52C90B-5BF3-717D-81E9-265F99FAE81F}"/>
+              </a:ext>
+            </a:extLst>
+          </p:cNvPr>
+          <p:cNvPicPr>
+            <a:picLocks noChangeAspect="1"/>
+          </p:cNvPicPr>
+          <p:nvPr/>
+        </p:nvPicPr>
+        <p:blipFill>
+          <a:blip r:embed="rId2"/>
+          <a:srcRect/>
+          <a:stretch/>
+        </p:blipFill>
+        <p:spPr>
+          <a:xfrm>
+            <a:off x="4865599" y="1621631"/>
+            <a:ext cx="2460802" cy="3087187"/>
+          </a:xfrm>
+          <a:prstGeom prst="rect">
+            <a:avLst/>
+          </a:prstGeom>
+        </p:spPr>
+      </p:pic>
+    </p:spTree>
+    <p:extLst>
+      <p:ext uri="{BB962C8B-B14F-4D97-AF65-F5344CB8AC3E}">
+        <p14:creationId xmlns:p14="http://schemas.microsoft.com/office/powerpoint/2010/main" val="3562465252"/>
       </p:ext>
     </p:extLst>
   </p:cSld>
@@ -6871,6 +7717,221 @@
 </p:sld>
 </file>
 
+<file path=ppt/slides/slide20.xml><?xml version="1.0" encoding="utf-8"?>
+<p:sld xmlns:a="http://schemas.openxmlformats.org/drawingml/2006/main" xmlns:r="http://schemas.openxmlformats.org/officeDocument/2006/relationships" xmlns:p="http://schemas.openxmlformats.org/presentationml/2006/main">
+  <p:cSld>
+    <p:spTree>
+      <p:nvGrpSpPr>
+        <p:cNvPr id="1" name=""/>
+        <p:cNvGrpSpPr/>
+        <p:nvPr/>
+      </p:nvGrpSpPr>
+      <p:grpSpPr>
+        <a:xfrm>
+          <a:off x="0" y="0"/>
+          <a:ext cx="0" cy="0"/>
+          <a:chOff x="0" y="0"/>
+          <a:chExt cx="0" cy="0"/>
+        </a:xfrm>
+      </p:grpSpPr>
+      <p:sp>
+        <p:nvSpPr>
+          <p:cNvPr id="4" name="TextBox 3">
+            <a:extLst>
+              <a:ext uri="{FF2B5EF4-FFF2-40B4-BE49-F238E27FC236}">
+                <a16:creationId xmlns:a16="http://schemas.microsoft.com/office/drawing/2014/main" id="{8A33E395-4222-4291-1E95-93A502F66925}"/>
+              </a:ext>
+            </a:extLst>
+          </p:cNvPr>
+          <p:cNvSpPr txBox="1"/>
+          <p:nvPr/>
+        </p:nvSpPr>
+        <p:spPr>
+          <a:xfrm>
+            <a:off x="753036" y="5809972"/>
+            <a:ext cx="10162760" cy="369332"/>
+          </a:xfrm>
+          <a:prstGeom prst="rect">
+            <a:avLst/>
+          </a:prstGeom>
+          <a:noFill/>
+        </p:spPr>
+        <p:txBody>
+          <a:bodyPr wrap="square" rtlCol="0">
+            <a:spAutoFit/>
+          </a:bodyPr>
+          <a:lstStyle/>
+          <a:p>
+            <a:pPr algn="ctr"/>
+            <a:r>
+              <a:rPr lang="de-DE" dirty="0">
+                <a:latin typeface="Cavolini" panose="03000502040302020204" pitchFamily="66" charset="0"/>
+                <a:cs typeface="Cavolini" panose="03000502040302020204" pitchFamily="66" charset="0"/>
+              </a:rPr>
+              <a:t>https://</a:t>
+            </a:r>
+            <a:r>
+              <a:rPr lang="de-DE" dirty="0" err="1">
+                <a:latin typeface="Cavolini" panose="03000502040302020204" pitchFamily="66" charset="0"/>
+                <a:cs typeface="Cavolini" panose="03000502040302020204" pitchFamily="66" charset="0"/>
+              </a:rPr>
+              <a:t>github.com</a:t>
+            </a:r>
+            <a:r>
+              <a:rPr lang="de-DE" dirty="0">
+                <a:latin typeface="Cavolini" panose="03000502040302020204" pitchFamily="66" charset="0"/>
+                <a:cs typeface="Cavolini" panose="03000502040302020204" pitchFamily="66" charset="0"/>
+              </a:rPr>
+              <a:t>/</a:t>
+            </a:r>
+            <a:r>
+              <a:rPr lang="de-DE" dirty="0" err="1">
+                <a:latin typeface="Cavolini" panose="03000502040302020204" pitchFamily="66" charset="0"/>
+                <a:cs typeface="Cavolini" panose="03000502040302020204" pitchFamily="66" charset="0"/>
+              </a:rPr>
+              <a:t>Fuenfgeld</a:t>
+            </a:r>
+            <a:r>
+              <a:rPr lang="de-DE" dirty="0">
+                <a:latin typeface="Cavolini" panose="03000502040302020204" pitchFamily="66" charset="0"/>
+                <a:cs typeface="Cavolini" panose="03000502040302020204" pitchFamily="66" charset="0"/>
+              </a:rPr>
+              <a:t>/DMA2022DataProjectC</a:t>
+            </a:r>
+          </a:p>
+        </p:txBody>
+      </p:sp>
+      <p:pic>
+        <p:nvPicPr>
+          <p:cNvPr id="3" name="Picture 2" descr="A picture containing text&#10;&#10;Description automatically generated">
+            <a:extLst>
+              <a:ext uri="{FF2B5EF4-FFF2-40B4-BE49-F238E27FC236}">
+                <a16:creationId xmlns:a16="http://schemas.microsoft.com/office/drawing/2014/main" id="{605563DA-7188-4240-01BE-303C87940687}"/>
+              </a:ext>
+            </a:extLst>
+          </p:cNvPr>
+          <p:cNvPicPr>
+            <a:picLocks noChangeAspect="1"/>
+          </p:cNvPicPr>
+          <p:nvPr/>
+        </p:nvPicPr>
+        <p:blipFill rotWithShape="1">
+          <a:blip r:embed="rId2"/>
+          <a:srcRect l="3618" t="20063" r="7646" b="31066"/>
+          <a:stretch/>
+        </p:blipFill>
+        <p:spPr>
+          <a:xfrm>
+            <a:off x="1014621" y="1137149"/>
+            <a:ext cx="9639591" cy="3706462"/>
+          </a:xfrm>
+          <a:prstGeom prst="rect">
+            <a:avLst/>
+          </a:prstGeom>
+        </p:spPr>
+      </p:pic>
+    </p:spTree>
+    <p:extLst>
+      <p:ext uri="{BB962C8B-B14F-4D97-AF65-F5344CB8AC3E}">
+        <p14:creationId xmlns:p14="http://schemas.microsoft.com/office/powerpoint/2010/main" val="3577887946"/>
+      </p:ext>
+    </p:extLst>
+  </p:cSld>
+  <p:clrMapOvr>
+    <a:masterClrMapping/>
+  </p:clrMapOvr>
+  <p:timing>
+    <p:tnLst>
+      <p:par>
+        <p:cTn id="1" dur="indefinite" restart="never" nodeType="tmRoot">
+          <p:childTnLst>
+            <p:seq concurrent="1" nextAc="seek">
+              <p:cTn id="2" dur="indefinite" nodeType="mainSeq">
+                <p:childTnLst>
+                  <p:par>
+                    <p:cTn id="3" fill="hold">
+                      <p:stCondLst>
+                        <p:cond delay="indefinite"/>
+                        <p:cond evt="onBegin" delay="0">
+                          <p:tn val="2"/>
+                        </p:cond>
+                      </p:stCondLst>
+                      <p:childTnLst>
+                        <p:par>
+                          <p:cTn id="4" fill="hold">
+                            <p:stCondLst>
+                              <p:cond delay="0"/>
+                            </p:stCondLst>
+                            <p:childTnLst>
+                              <p:par>
+                                <p:cTn id="5" presetID="10" presetClass="entr" presetSubtype="0" fill="hold" grpId="0" nodeType="afterEffect">
+                                  <p:stCondLst>
+                                    <p:cond delay="1000"/>
+                                  </p:stCondLst>
+                                  <p:childTnLst>
+                                    <p:set>
+                                      <p:cBhvr>
+                                        <p:cTn id="6" dur="1" fill="hold">
+                                          <p:stCondLst>
+                                            <p:cond delay="0"/>
+                                          </p:stCondLst>
+                                        </p:cTn>
+                                        <p:tgtEl>
+                                          <p:spTgt spid="4"/>
+                                        </p:tgtEl>
+                                        <p:attrNameLst>
+                                          <p:attrName>style.visibility</p:attrName>
+                                        </p:attrNameLst>
+                                      </p:cBhvr>
+                                      <p:to>
+                                        <p:strVal val="visible"/>
+                                      </p:to>
+                                    </p:set>
+                                    <p:animEffect transition="in" filter="fade">
+                                      <p:cBhvr>
+                                        <p:cTn id="7" dur="2000"/>
+                                        <p:tgtEl>
+                                          <p:spTgt spid="4"/>
+                                        </p:tgtEl>
+                                      </p:cBhvr>
+                                    </p:animEffect>
+                                  </p:childTnLst>
+                                </p:cTn>
+                              </p:par>
+                            </p:childTnLst>
+                          </p:cTn>
+                        </p:par>
+                      </p:childTnLst>
+                    </p:cTn>
+                  </p:par>
+                </p:childTnLst>
+              </p:cTn>
+              <p:prevCondLst>
+                <p:cond evt="onPrev" delay="0">
+                  <p:tgtEl>
+                    <p:sldTgt/>
+                  </p:tgtEl>
+                </p:cond>
+              </p:prevCondLst>
+              <p:nextCondLst>
+                <p:cond evt="onNext" delay="0">
+                  <p:tgtEl>
+                    <p:sldTgt/>
+                  </p:tgtEl>
+                </p:cond>
+              </p:nextCondLst>
+            </p:seq>
+          </p:childTnLst>
+        </p:cTn>
+      </p:par>
+    </p:tnLst>
+    <p:bldLst>
+      <p:bldP spid="4" grpId="0"/>
+    </p:bldLst>
+  </p:timing>
+</p:sld>
+</file>
+
 <file path=ppt/slides/slide3.xml><?xml version="1.0" encoding="utf-8"?>
 <p:sld xmlns:a="http://schemas.openxmlformats.org/drawingml/2006/main" xmlns:r="http://schemas.openxmlformats.org/officeDocument/2006/relationships" xmlns:p="http://schemas.openxmlformats.org/presentationml/2006/main">
   <p:cSld>
@@ -6924,55 +7985,6 @@
           </a:p>
         </p:txBody>
       </p:sp>
-      <p:sp>
-        <p:nvSpPr>
-          <p:cNvPr id="3" name="Rectangle 2">
-            <a:extLst>
-              <a:ext uri="{FF2B5EF4-FFF2-40B4-BE49-F238E27FC236}">
-                <a16:creationId xmlns:a16="http://schemas.microsoft.com/office/drawing/2014/main" id="{7743483E-21B4-B2D5-DFF7-E6435EA0D13C}"/>
-              </a:ext>
-            </a:extLst>
-          </p:cNvPr>
-          <p:cNvSpPr/>
-          <p:nvPr/>
-        </p:nvSpPr>
-        <p:spPr>
-          <a:xfrm>
-            <a:off x="1618228" y="1892673"/>
-            <a:ext cx="2823882" cy="3072653"/>
-          </a:xfrm>
-          <a:prstGeom prst="rect">
-            <a:avLst/>
-          </a:prstGeom>
-        </p:spPr>
-        <p:style>
-          <a:lnRef idx="2">
-            <a:schemeClr val="accent1">
-              <a:shade val="50000"/>
-            </a:schemeClr>
-          </a:lnRef>
-          <a:fillRef idx="1">
-            <a:schemeClr val="accent1"/>
-          </a:fillRef>
-          <a:effectRef idx="0">
-            <a:schemeClr val="accent1"/>
-          </a:effectRef>
-          <a:fontRef idx="minor">
-            <a:schemeClr val="lt1"/>
-          </a:fontRef>
-        </p:style>
-        <p:txBody>
-          <a:bodyPr rtlCol="0" anchor="ctr"/>
-          <a:lstStyle/>
-          <a:p>
-            <a:pPr algn="ctr"/>
-            <a:r>
-              <a:rPr lang="de-DE" dirty="0"/>
-              <a:t>Grafik Problem?</a:t>
-            </a:r>
-          </a:p>
-        </p:txBody>
-      </p:sp>
       <p:pic>
         <p:nvPicPr>
           <p:cNvPr id="6" name="Picture 5" descr="Icon&#10;&#10;Description automatically generated">
@@ -6997,6 +8009,36 @@
           <a:xfrm>
             <a:off x="7749891" y="1418665"/>
             <a:ext cx="2595475" cy="4353112"/>
+          </a:xfrm>
+          <a:prstGeom prst="rect">
+            <a:avLst/>
+          </a:prstGeom>
+        </p:spPr>
+      </p:pic>
+      <p:pic>
+        <p:nvPicPr>
+          <p:cNvPr id="5" name="Picture 4" descr="Shape, circle&#10;&#10;Description automatically generated with medium confidence">
+            <a:extLst>
+              <a:ext uri="{FF2B5EF4-FFF2-40B4-BE49-F238E27FC236}">
+                <a16:creationId xmlns:a16="http://schemas.microsoft.com/office/drawing/2014/main" id="{90E8F8C8-F42F-C766-DDA6-B8CE740029CF}"/>
+              </a:ext>
+            </a:extLst>
+          </p:cNvPr>
+          <p:cNvPicPr>
+            <a:picLocks noChangeAspect="1"/>
+          </p:cNvPicPr>
+          <p:nvPr/>
+        </p:nvPicPr>
+        <p:blipFill>
+          <a:blip r:embed="rId3"/>
+          <a:stretch>
+            <a:fillRect/>
+          </a:stretch>
+        </p:blipFill>
+        <p:spPr>
+          <a:xfrm>
+            <a:off x="1961229" y="1354150"/>
+            <a:ext cx="2515591" cy="3729097"/>
           </a:xfrm>
           <a:prstGeom prst="rect">
             <a:avLst/>
@@ -7047,7 +8089,7 @@
         </p:nvSpPr>
         <p:spPr>
           <a:xfrm>
-            <a:off x="3688556" y="2865065"/>
+            <a:off x="3876815" y="357189"/>
             <a:ext cx="4814887" cy="369332"/>
           </a:xfrm>
           <a:prstGeom prst="rect">
@@ -7064,66 +8106,17 @@
             <a:pPr algn="ctr"/>
             <a:r>
               <a:rPr lang="de-DE" dirty="0"/>
-              <a:t>Vorstellung Zweck?</a:t>
-            </a:r>
-          </a:p>
-        </p:txBody>
-      </p:sp>
-      <p:sp>
-        <p:nvSpPr>
-          <p:cNvPr id="3" name="Rectangle 2">
-            <a:extLst>
-              <a:ext uri="{FF2B5EF4-FFF2-40B4-BE49-F238E27FC236}">
-                <a16:creationId xmlns:a16="http://schemas.microsoft.com/office/drawing/2014/main" id="{7743483E-21B4-B2D5-DFF7-E6435EA0D13C}"/>
-              </a:ext>
-            </a:extLst>
-          </p:cNvPr>
-          <p:cNvSpPr/>
-          <p:nvPr/>
-        </p:nvSpPr>
-        <p:spPr>
-          <a:xfrm>
-            <a:off x="1322294" y="2017900"/>
-            <a:ext cx="2823882" cy="3072653"/>
-          </a:xfrm>
-          <a:prstGeom prst="rect">
-            <a:avLst/>
-          </a:prstGeom>
-        </p:spPr>
-        <p:style>
-          <a:lnRef idx="2">
-            <a:schemeClr val="accent1">
-              <a:shade val="50000"/>
-            </a:schemeClr>
-          </a:lnRef>
-          <a:fillRef idx="1">
-            <a:schemeClr val="accent1"/>
-          </a:fillRef>
-          <a:effectRef idx="0">
-            <a:schemeClr val="accent1"/>
-          </a:effectRef>
-          <a:fontRef idx="minor">
-            <a:schemeClr val="lt1"/>
-          </a:fontRef>
-        </p:style>
-        <p:txBody>
-          <a:bodyPr rtlCol="0" anchor="ctr"/>
-          <a:lstStyle/>
-          <a:p>
-            <a:pPr algn="ctr"/>
-            <a:r>
-              <a:rPr lang="de-DE" dirty="0"/>
-              <a:t>Vorgesetzter</a:t>
+              <a:t>Vorstellung Paul</a:t>
             </a:r>
           </a:p>
         </p:txBody>
       </p:sp>
       <p:pic>
         <p:nvPicPr>
-          <p:cNvPr id="5" name="Picture 4" descr="Icon&#10;&#10;Description automatically generated">
-            <a:extLst>
-              <a:ext uri="{FF2B5EF4-FFF2-40B4-BE49-F238E27FC236}">
-                <a16:creationId xmlns:a16="http://schemas.microsoft.com/office/drawing/2014/main" id="{36043B1F-018D-00D3-697F-9EE51D45FD42}"/>
+          <p:cNvPr id="6" name="Picture 5" descr="Icon&#10;&#10;Description automatically generated">
+            <a:extLst>
+              <a:ext uri="{FF2B5EF4-FFF2-40B4-BE49-F238E27FC236}">
+                <a16:creationId xmlns:a16="http://schemas.microsoft.com/office/drawing/2014/main" id="{6243AFED-8847-F8C4-3195-0EF5F6A120B5}"/>
               </a:ext>
             </a:extLst>
           </p:cNvPr>
@@ -7148,10 +8141,39 @@
           </a:prstGeom>
         </p:spPr>
       </p:pic>
+      <p:pic>
+        <p:nvPicPr>
+          <p:cNvPr id="5" name="Picture 4">
+            <a:extLst>
+              <a:ext uri="{FF2B5EF4-FFF2-40B4-BE49-F238E27FC236}">
+                <a16:creationId xmlns:a16="http://schemas.microsoft.com/office/drawing/2014/main" id="{90E8F8C8-F42F-C766-DDA6-B8CE740029CF}"/>
+              </a:ext>
+            </a:extLst>
+          </p:cNvPr>
+          <p:cNvPicPr>
+            <a:picLocks noChangeAspect="1"/>
+          </p:cNvPicPr>
+          <p:nvPr/>
+        </p:nvPicPr>
+        <p:blipFill>
+          <a:blip r:embed="rId3"/>
+          <a:srcRect/>
+          <a:stretch/>
+        </p:blipFill>
+        <p:spPr>
+          <a:xfrm>
+            <a:off x="2016090" y="1354150"/>
+            <a:ext cx="2405869" cy="3729097"/>
+          </a:xfrm>
+          <a:prstGeom prst="rect">
+            <a:avLst/>
+          </a:prstGeom>
+        </p:spPr>
+      </p:pic>
     </p:spTree>
     <p:extLst>
       <p:ext uri="{BB962C8B-B14F-4D97-AF65-F5344CB8AC3E}">
-        <p14:creationId xmlns:p14="http://schemas.microsoft.com/office/powerpoint/2010/main" val="3933667600"/>
+        <p14:creationId xmlns:p14="http://schemas.microsoft.com/office/powerpoint/2010/main" val="3084247660"/>
       </p:ext>
     </p:extLst>
   </p:cSld>
@@ -7192,6 +8214,221 @@
         </p:nvSpPr>
         <p:spPr>
           <a:xfrm>
+            <a:off x="3876815" y="357189"/>
+            <a:ext cx="4814887" cy="369332"/>
+          </a:xfrm>
+          <a:prstGeom prst="rect">
+            <a:avLst/>
+          </a:prstGeom>
+          <a:noFill/>
+        </p:spPr>
+        <p:txBody>
+          <a:bodyPr wrap="square" rtlCol="0">
+            <a:spAutoFit/>
+          </a:bodyPr>
+          <a:lstStyle/>
+          <a:p>
+            <a:pPr algn="ctr"/>
+            <a:r>
+              <a:rPr lang="de-DE" dirty="0"/>
+              <a:t>Vorstellung Paul</a:t>
+            </a:r>
+          </a:p>
+        </p:txBody>
+      </p:sp>
+      <p:pic>
+        <p:nvPicPr>
+          <p:cNvPr id="6" name="Picture 5" descr="Icon&#10;&#10;Description automatically generated">
+            <a:extLst>
+              <a:ext uri="{FF2B5EF4-FFF2-40B4-BE49-F238E27FC236}">
+                <a16:creationId xmlns:a16="http://schemas.microsoft.com/office/drawing/2014/main" id="{6243AFED-8847-F8C4-3195-0EF5F6A120B5}"/>
+              </a:ext>
+            </a:extLst>
+          </p:cNvPr>
+          <p:cNvPicPr>
+            <a:picLocks noChangeAspect="1"/>
+          </p:cNvPicPr>
+          <p:nvPr/>
+        </p:nvPicPr>
+        <p:blipFill>
+          <a:blip r:embed="rId2"/>
+          <a:stretch>
+            <a:fillRect/>
+          </a:stretch>
+        </p:blipFill>
+        <p:spPr>
+          <a:xfrm>
+            <a:off x="7749891" y="1418665"/>
+            <a:ext cx="2595475" cy="4353112"/>
+          </a:xfrm>
+          <a:prstGeom prst="rect">
+            <a:avLst/>
+          </a:prstGeom>
+        </p:spPr>
+      </p:pic>
+      <p:pic>
+        <p:nvPicPr>
+          <p:cNvPr id="5" name="Picture 4">
+            <a:extLst>
+              <a:ext uri="{FF2B5EF4-FFF2-40B4-BE49-F238E27FC236}">
+                <a16:creationId xmlns:a16="http://schemas.microsoft.com/office/drawing/2014/main" id="{90E8F8C8-F42F-C766-DDA6-B8CE740029CF}"/>
+              </a:ext>
+            </a:extLst>
+          </p:cNvPr>
+          <p:cNvPicPr>
+            <a:picLocks noChangeAspect="1"/>
+          </p:cNvPicPr>
+          <p:nvPr/>
+        </p:nvPicPr>
+        <p:blipFill>
+          <a:blip r:embed="rId3"/>
+          <a:srcRect/>
+          <a:stretch/>
+        </p:blipFill>
+        <p:spPr>
+          <a:xfrm>
+            <a:off x="2016090" y="1414297"/>
+            <a:ext cx="2405869" cy="3608803"/>
+          </a:xfrm>
+          <a:prstGeom prst="rect">
+            <a:avLst/>
+          </a:prstGeom>
+        </p:spPr>
+      </p:pic>
+    </p:spTree>
+    <p:extLst>
+      <p:ext uri="{BB962C8B-B14F-4D97-AF65-F5344CB8AC3E}">
+        <p14:creationId xmlns:p14="http://schemas.microsoft.com/office/powerpoint/2010/main" val="1043236456"/>
+      </p:ext>
+    </p:extLst>
+  </p:cSld>
+  <p:clrMapOvr>
+    <a:masterClrMapping/>
+  </p:clrMapOvr>
+</p:sld>
+</file>
+
+<file path=ppt/slides/slide6.xml><?xml version="1.0" encoding="utf-8"?>
+<p:sld xmlns:a="http://schemas.openxmlformats.org/drawingml/2006/main" xmlns:r="http://schemas.openxmlformats.org/officeDocument/2006/relationships" xmlns:p="http://schemas.openxmlformats.org/presentationml/2006/main">
+  <p:cSld>
+    <p:spTree>
+      <p:nvGrpSpPr>
+        <p:cNvPr id="1" name=""/>
+        <p:cNvGrpSpPr/>
+        <p:nvPr/>
+      </p:nvGrpSpPr>
+      <p:grpSpPr>
+        <a:xfrm>
+          <a:off x="0" y="0"/>
+          <a:ext cx="0" cy="0"/>
+          <a:chOff x="0" y="0"/>
+          <a:chExt cx="0" cy="0"/>
+        </a:xfrm>
+      </p:grpSpPr>
+      <p:pic>
+        <p:nvPicPr>
+          <p:cNvPr id="5" name="Picture 4" descr="Icon&#10;&#10;Description automatically generated">
+            <a:extLst>
+              <a:ext uri="{FF2B5EF4-FFF2-40B4-BE49-F238E27FC236}">
+                <a16:creationId xmlns:a16="http://schemas.microsoft.com/office/drawing/2014/main" id="{36043B1F-018D-00D3-697F-9EE51D45FD42}"/>
+              </a:ext>
+            </a:extLst>
+          </p:cNvPr>
+          <p:cNvPicPr>
+            <a:picLocks noChangeAspect="1"/>
+          </p:cNvPicPr>
+          <p:nvPr/>
+        </p:nvPicPr>
+        <p:blipFill>
+          <a:blip r:embed="rId2"/>
+          <a:stretch>
+            <a:fillRect/>
+          </a:stretch>
+        </p:blipFill>
+        <p:spPr>
+          <a:xfrm>
+            <a:off x="7749891" y="1418665"/>
+            <a:ext cx="2595475" cy="4353112"/>
+          </a:xfrm>
+          <a:prstGeom prst="rect">
+            <a:avLst/>
+          </a:prstGeom>
+        </p:spPr>
+      </p:pic>
+      <p:pic>
+        <p:nvPicPr>
+          <p:cNvPr id="6" name="Picture 5">
+            <a:extLst>
+              <a:ext uri="{FF2B5EF4-FFF2-40B4-BE49-F238E27FC236}">
+                <a16:creationId xmlns:a16="http://schemas.microsoft.com/office/drawing/2014/main" id="{64857574-48E4-F58F-A6E3-46AE78BF2D8A}"/>
+              </a:ext>
+            </a:extLst>
+          </p:cNvPr>
+          <p:cNvPicPr>
+            <a:picLocks noChangeAspect="1"/>
+          </p:cNvPicPr>
+          <p:nvPr/>
+        </p:nvPicPr>
+        <p:blipFill>
+          <a:blip r:embed="rId3"/>
+          <a:stretch>
+            <a:fillRect/>
+          </a:stretch>
+        </p:blipFill>
+        <p:spPr>
+          <a:xfrm>
+            <a:off x="2095889" y="1418665"/>
+            <a:ext cx="2129851" cy="3832055"/>
+          </a:xfrm>
+          <a:prstGeom prst="rect">
+            <a:avLst/>
+          </a:prstGeom>
+        </p:spPr>
+      </p:pic>
+    </p:spTree>
+    <p:extLst>
+      <p:ext uri="{BB962C8B-B14F-4D97-AF65-F5344CB8AC3E}">
+        <p14:creationId xmlns:p14="http://schemas.microsoft.com/office/powerpoint/2010/main" val="3933667600"/>
+      </p:ext>
+    </p:extLst>
+  </p:cSld>
+  <p:clrMapOvr>
+    <a:masterClrMapping/>
+  </p:clrMapOvr>
+</p:sld>
+</file>
+
+<file path=ppt/slides/slide7.xml><?xml version="1.0" encoding="utf-8"?>
+<p:sld xmlns:a="http://schemas.openxmlformats.org/drawingml/2006/main" xmlns:r="http://schemas.openxmlformats.org/officeDocument/2006/relationships" xmlns:p="http://schemas.openxmlformats.org/presentationml/2006/main">
+  <p:cSld>
+    <p:spTree>
+      <p:nvGrpSpPr>
+        <p:cNvPr id="1" name=""/>
+        <p:cNvGrpSpPr/>
+        <p:nvPr/>
+      </p:nvGrpSpPr>
+      <p:grpSpPr>
+        <a:xfrm>
+          <a:off x="0" y="0"/>
+          <a:ext cx="0" cy="0"/>
+          <a:chOff x="0" y="0"/>
+          <a:chExt cx="0" cy="0"/>
+        </a:xfrm>
+      </p:grpSpPr>
+      <p:sp>
+        <p:nvSpPr>
+          <p:cNvPr id="4" name="TextBox 3">
+            <a:extLst>
+              <a:ext uri="{FF2B5EF4-FFF2-40B4-BE49-F238E27FC236}">
+                <a16:creationId xmlns:a16="http://schemas.microsoft.com/office/drawing/2014/main" id="{8A33E395-4222-4291-1E95-93A502F66925}"/>
+              </a:ext>
+            </a:extLst>
+          </p:cNvPr>
+          <p:cNvSpPr txBox="1"/>
+          <p:nvPr/>
+        </p:nvSpPr>
+        <p:spPr>
+          <a:xfrm>
             <a:off x="3688556" y="323570"/>
             <a:ext cx="4814887" cy="369332"/>
           </a:xfrm>
@@ -7287,7 +8524,7 @@
 </p:sld>
 </file>
 
-<file path=ppt/slides/slide6.xml><?xml version="1.0" encoding="utf-8"?>
+<file path=ppt/slides/slide8.xml><?xml version="1.0" encoding="utf-8"?>
 <p:sld xmlns:a="http://schemas.openxmlformats.org/drawingml/2006/main" xmlns:r="http://schemas.openxmlformats.org/officeDocument/2006/relationships" xmlns:p="http://schemas.openxmlformats.org/presentationml/2006/main">
   <p:cSld>
     <p:spTree>
@@ -7534,7 +8771,7 @@
 </p:sld>
 </file>
 
-<file path=ppt/slides/slide7.xml><?xml version="1.0" encoding="utf-8"?>
+<file path=ppt/slides/slide9.xml><?xml version="1.0" encoding="utf-8"?>
 <p:sld xmlns:a="http://schemas.openxmlformats.org/drawingml/2006/main" xmlns:r="http://schemas.openxmlformats.org/officeDocument/2006/relationships" xmlns:p="http://schemas.openxmlformats.org/presentationml/2006/main">
   <p:cSld>
     <p:spTree>
@@ -8222,922 +9459,6 @@
 </p:sld>
 </file>
 
-<file path=ppt/slides/slide8.xml><?xml version="1.0" encoding="utf-8"?>
-<p:sld xmlns:a="http://schemas.openxmlformats.org/drawingml/2006/main" xmlns:r="http://schemas.openxmlformats.org/officeDocument/2006/relationships" xmlns:p="http://schemas.openxmlformats.org/presentationml/2006/main">
-  <p:cSld>
-    <p:spTree>
-      <p:nvGrpSpPr>
-        <p:cNvPr id="1" name=""/>
-        <p:cNvGrpSpPr/>
-        <p:nvPr/>
-      </p:nvGrpSpPr>
-      <p:grpSpPr>
-        <a:xfrm>
-          <a:off x="0" y="0"/>
-          <a:ext cx="0" cy="0"/>
-          <a:chOff x="0" y="0"/>
-          <a:chExt cx="0" cy="0"/>
-        </a:xfrm>
-      </p:grpSpPr>
-      <p:sp>
-        <p:nvSpPr>
-          <p:cNvPr id="4" name="TextBox 3">
-            <a:extLst>
-              <a:ext uri="{FF2B5EF4-FFF2-40B4-BE49-F238E27FC236}">
-                <a16:creationId xmlns:a16="http://schemas.microsoft.com/office/drawing/2014/main" id="{8A33E395-4222-4291-1E95-93A502F66925}"/>
-              </a:ext>
-            </a:extLst>
-          </p:cNvPr>
-          <p:cNvSpPr txBox="1"/>
-          <p:nvPr/>
-        </p:nvSpPr>
-        <p:spPr>
-          <a:xfrm>
-            <a:off x="3688556" y="323570"/>
-            <a:ext cx="4814887" cy="369332"/>
-          </a:xfrm>
-          <a:prstGeom prst="rect">
-            <a:avLst/>
-          </a:prstGeom>
-          <a:noFill/>
-        </p:spPr>
-        <p:txBody>
-          <a:bodyPr wrap="square" rtlCol="0">
-            <a:spAutoFit/>
-          </a:bodyPr>
-          <a:lstStyle/>
-          <a:p>
-            <a:pPr algn="ctr"/>
-            <a:r>
-              <a:rPr lang="de-DE" dirty="0"/>
-              <a:t>Vorstellung Lea</a:t>
-            </a:r>
-          </a:p>
-        </p:txBody>
-      </p:sp>
-      <p:pic>
-        <p:nvPicPr>
-          <p:cNvPr id="9" name="Picture 8" descr="Icon&#10;&#10;Description automatically generated">
-            <a:extLst>
-              <a:ext uri="{FF2B5EF4-FFF2-40B4-BE49-F238E27FC236}">
-                <a16:creationId xmlns:a16="http://schemas.microsoft.com/office/drawing/2014/main" id="{9068B551-59E2-4997-1377-E1EC50E15BA0}"/>
-              </a:ext>
-            </a:extLst>
-          </p:cNvPr>
-          <p:cNvPicPr>
-            <a:picLocks noChangeAspect="1"/>
-          </p:cNvPicPr>
-          <p:nvPr/>
-        </p:nvPicPr>
-        <p:blipFill>
-          <a:blip r:embed="rId2"/>
-          <a:stretch>
-            <a:fillRect/>
-          </a:stretch>
-        </p:blipFill>
-        <p:spPr>
-          <a:xfrm>
-            <a:off x="9249239" y="3197879"/>
-            <a:ext cx="2075946" cy="3481762"/>
-          </a:xfrm>
-          <a:prstGeom prst="rect">
-            <a:avLst/>
-          </a:prstGeom>
-        </p:spPr>
-      </p:pic>
-      <p:pic>
-        <p:nvPicPr>
-          <p:cNvPr id="11" name="Picture 10">
-            <a:extLst>
-              <a:ext uri="{FF2B5EF4-FFF2-40B4-BE49-F238E27FC236}">
-                <a16:creationId xmlns:a16="http://schemas.microsoft.com/office/drawing/2014/main" id="{BB8A122F-D339-92D1-D65E-970D37172760}"/>
-              </a:ext>
-            </a:extLst>
-          </p:cNvPr>
-          <p:cNvPicPr>
-            <a:picLocks noChangeAspect="1"/>
-          </p:cNvPicPr>
-          <p:nvPr/>
-        </p:nvPicPr>
-        <p:blipFill>
-          <a:blip r:embed="rId3"/>
-          <a:stretch>
-            <a:fillRect/>
-          </a:stretch>
-        </p:blipFill>
-        <p:spPr>
-          <a:xfrm>
-            <a:off x="5003524" y="979114"/>
-            <a:ext cx="2103245" cy="4437529"/>
-          </a:xfrm>
-          <a:prstGeom prst="rect">
-            <a:avLst/>
-          </a:prstGeom>
-        </p:spPr>
-      </p:pic>
-      <p:sp>
-        <p:nvSpPr>
-          <p:cNvPr id="12" name="Oval Callout 11">
-            <a:extLst>
-              <a:ext uri="{FF2B5EF4-FFF2-40B4-BE49-F238E27FC236}">
-                <a16:creationId xmlns:a16="http://schemas.microsoft.com/office/drawing/2014/main" id="{EE6F1982-82B2-2A7F-2E32-ED8D40E5E3FF}"/>
-              </a:ext>
-            </a:extLst>
-          </p:cNvPr>
-          <p:cNvSpPr/>
-          <p:nvPr/>
-        </p:nvSpPr>
-        <p:spPr>
-          <a:xfrm>
-            <a:off x="7301125" y="742950"/>
-            <a:ext cx="2986087" cy="1464469"/>
-          </a:xfrm>
-          <a:prstGeom prst="wedgeEllipseCallout">
-            <a:avLst>
-              <a:gd name="adj1" fmla="val -45953"/>
-              <a:gd name="adj2" fmla="val 67866"/>
-            </a:avLst>
-          </a:prstGeom>
-          <a:solidFill>
-            <a:schemeClr val="bg1"/>
-          </a:solidFill>
-          <a:ln w="57150">
-            <a:solidFill>
-              <a:schemeClr val="tx1"/>
-            </a:solidFill>
-          </a:ln>
-        </p:spPr>
-        <p:style>
-          <a:lnRef idx="2">
-            <a:schemeClr val="accent1">
-              <a:shade val="50000"/>
-            </a:schemeClr>
-          </a:lnRef>
-          <a:fillRef idx="1">
-            <a:schemeClr val="accent1"/>
-          </a:fillRef>
-          <a:effectRef idx="0">
-            <a:schemeClr val="accent1"/>
-          </a:effectRef>
-          <a:fontRef idx="minor">
-            <a:schemeClr val="lt1"/>
-          </a:fontRef>
-        </p:style>
-        <p:txBody>
-          <a:bodyPr rtlCol="0" anchor="ctr"/>
-          <a:lstStyle/>
-          <a:p>
-            <a:pPr algn="ctr"/>
-            <a:r>
-              <a:rPr lang="de-DE" sz="3200" dirty="0">
-                <a:solidFill>
-                  <a:schemeClr val="tx1"/>
-                </a:solidFill>
-                <a:latin typeface="Cavolini" panose="03000502040302020204" pitchFamily="66" charset="0"/>
-                <a:cs typeface="Cavolini" panose="03000502040302020204" pitchFamily="66" charset="0"/>
-              </a:rPr>
-              <a:t>HI</a:t>
-            </a:r>
-          </a:p>
-        </p:txBody>
-      </p:sp>
-    </p:spTree>
-    <p:extLst>
-      <p:ext uri="{BB962C8B-B14F-4D97-AF65-F5344CB8AC3E}">
-        <p14:creationId xmlns:p14="http://schemas.microsoft.com/office/powerpoint/2010/main" val="2653906680"/>
-      </p:ext>
-    </p:extLst>
-  </p:cSld>
-  <p:clrMapOvr>
-    <a:masterClrMapping/>
-  </p:clrMapOvr>
-  <p:timing>
-    <p:tnLst>
-      <p:par>
-        <p:cTn id="1" dur="indefinite" restart="never" nodeType="tmRoot">
-          <p:childTnLst>
-            <p:seq concurrent="1" nextAc="seek">
-              <p:cTn id="2" dur="indefinite" nodeType="mainSeq">
-                <p:childTnLst>
-                  <p:par>
-                    <p:cTn id="3" fill="hold">
-                      <p:stCondLst>
-                        <p:cond delay="indefinite"/>
-                      </p:stCondLst>
-                      <p:childTnLst>
-                        <p:par>
-                          <p:cTn id="4" fill="hold">
-                            <p:stCondLst>
-                              <p:cond delay="0"/>
-                            </p:stCondLst>
-                            <p:childTnLst>
-                              <p:par>
-                                <p:cTn id="5" presetID="53" presetClass="entr" presetSubtype="16" fill="hold" grpId="0" nodeType="clickEffect">
-                                  <p:stCondLst>
-                                    <p:cond delay="0"/>
-                                  </p:stCondLst>
-                                  <p:childTnLst>
-                                    <p:set>
-                                      <p:cBhvr>
-                                        <p:cTn id="6" dur="1" fill="hold">
-                                          <p:stCondLst>
-                                            <p:cond delay="0"/>
-                                          </p:stCondLst>
-                                        </p:cTn>
-                                        <p:tgtEl>
-                                          <p:spTgt spid="12"/>
-                                        </p:tgtEl>
-                                        <p:attrNameLst>
-                                          <p:attrName>style.visibility</p:attrName>
-                                        </p:attrNameLst>
-                                      </p:cBhvr>
-                                      <p:to>
-                                        <p:strVal val="visible"/>
-                                      </p:to>
-                                    </p:set>
-                                    <p:anim calcmode="lin" valueType="num">
-                                      <p:cBhvr>
-                                        <p:cTn id="7" dur="500" fill="hold"/>
-                                        <p:tgtEl>
-                                          <p:spTgt spid="12"/>
-                                        </p:tgtEl>
-                                        <p:attrNameLst>
-                                          <p:attrName>ppt_w</p:attrName>
-                                        </p:attrNameLst>
-                                      </p:cBhvr>
-                                      <p:tavLst>
-                                        <p:tav tm="0">
-                                          <p:val>
-                                            <p:fltVal val="0"/>
-                                          </p:val>
-                                        </p:tav>
-                                        <p:tav tm="100000">
-                                          <p:val>
-                                            <p:strVal val="#ppt_w"/>
-                                          </p:val>
-                                        </p:tav>
-                                      </p:tavLst>
-                                    </p:anim>
-                                    <p:anim calcmode="lin" valueType="num">
-                                      <p:cBhvr>
-                                        <p:cTn id="8" dur="500" fill="hold"/>
-                                        <p:tgtEl>
-                                          <p:spTgt spid="12"/>
-                                        </p:tgtEl>
-                                        <p:attrNameLst>
-                                          <p:attrName>ppt_h</p:attrName>
-                                        </p:attrNameLst>
-                                      </p:cBhvr>
-                                      <p:tavLst>
-                                        <p:tav tm="0">
-                                          <p:val>
-                                            <p:fltVal val="0"/>
-                                          </p:val>
-                                        </p:tav>
-                                        <p:tav tm="100000">
-                                          <p:val>
-                                            <p:strVal val="#ppt_h"/>
-                                          </p:val>
-                                        </p:tav>
-                                      </p:tavLst>
-                                    </p:anim>
-                                    <p:animEffect transition="in" filter="fade">
-                                      <p:cBhvr>
-                                        <p:cTn id="9" dur="500"/>
-                                        <p:tgtEl>
-                                          <p:spTgt spid="12"/>
-                                        </p:tgtEl>
-                                      </p:cBhvr>
-                                    </p:animEffect>
-                                  </p:childTnLst>
-                                </p:cTn>
-                              </p:par>
-                            </p:childTnLst>
-                          </p:cTn>
-                        </p:par>
-                      </p:childTnLst>
-                    </p:cTn>
-                  </p:par>
-                </p:childTnLst>
-              </p:cTn>
-              <p:prevCondLst>
-                <p:cond evt="onPrev" delay="0">
-                  <p:tgtEl>
-                    <p:sldTgt/>
-                  </p:tgtEl>
-                </p:cond>
-              </p:prevCondLst>
-              <p:nextCondLst>
-                <p:cond evt="onNext" delay="0">
-                  <p:tgtEl>
-                    <p:sldTgt/>
-                  </p:tgtEl>
-                </p:cond>
-              </p:nextCondLst>
-            </p:seq>
-          </p:childTnLst>
-        </p:cTn>
-      </p:par>
-    </p:tnLst>
-    <p:bldLst>
-      <p:bldP spid="12" grpId="0" animBg="1"/>
-    </p:bldLst>
-  </p:timing>
-</p:sld>
-</file>
-
-<file path=ppt/slides/slide9.xml><?xml version="1.0" encoding="utf-8"?>
-<p:sld xmlns:a="http://schemas.openxmlformats.org/drawingml/2006/main" xmlns:r="http://schemas.openxmlformats.org/officeDocument/2006/relationships" xmlns:p="http://schemas.openxmlformats.org/presentationml/2006/main">
-  <p:cSld>
-    <p:spTree>
-      <p:nvGrpSpPr>
-        <p:cNvPr id="1" name=""/>
-        <p:cNvGrpSpPr/>
-        <p:nvPr/>
-      </p:nvGrpSpPr>
-      <p:grpSpPr>
-        <a:xfrm>
-          <a:off x="0" y="0"/>
-          <a:ext cx="0" cy="0"/>
-          <a:chOff x="0" y="0"/>
-          <a:chExt cx="0" cy="0"/>
-        </a:xfrm>
-      </p:grpSpPr>
-      <p:sp>
-        <p:nvSpPr>
-          <p:cNvPr id="4" name="TextBox 3">
-            <a:extLst>
-              <a:ext uri="{FF2B5EF4-FFF2-40B4-BE49-F238E27FC236}">
-                <a16:creationId xmlns:a16="http://schemas.microsoft.com/office/drawing/2014/main" id="{8A33E395-4222-4291-1E95-93A502F66925}"/>
-              </a:ext>
-            </a:extLst>
-          </p:cNvPr>
-          <p:cNvSpPr txBox="1"/>
-          <p:nvPr/>
-        </p:nvSpPr>
-        <p:spPr>
-          <a:xfrm>
-            <a:off x="3688556" y="323570"/>
-            <a:ext cx="4814887" cy="369332"/>
-          </a:xfrm>
-          <a:prstGeom prst="rect">
-            <a:avLst/>
-          </a:prstGeom>
-          <a:noFill/>
-        </p:spPr>
-        <p:txBody>
-          <a:bodyPr wrap="square" rtlCol="0">
-            <a:spAutoFit/>
-          </a:bodyPr>
-          <a:lstStyle/>
-          <a:p>
-            <a:pPr algn="ctr"/>
-            <a:r>
-              <a:rPr lang="de-DE" dirty="0"/>
-              <a:t>Datenmanagementplan</a:t>
-            </a:r>
-          </a:p>
-        </p:txBody>
-      </p:sp>
-      <p:pic>
-        <p:nvPicPr>
-          <p:cNvPr id="6" name="Picture 5" descr="Icon&#10;&#10;Description automatically generated">
-            <a:extLst>
-              <a:ext uri="{FF2B5EF4-FFF2-40B4-BE49-F238E27FC236}">
-                <a16:creationId xmlns:a16="http://schemas.microsoft.com/office/drawing/2014/main" id="{9184CE39-350E-DBAB-67CC-ABDD6868A55B}"/>
-              </a:ext>
-            </a:extLst>
-          </p:cNvPr>
-          <p:cNvPicPr>
-            <a:picLocks noChangeAspect="1"/>
-          </p:cNvPicPr>
-          <p:nvPr/>
-        </p:nvPicPr>
-        <p:blipFill>
-          <a:blip r:embed="rId2"/>
-          <a:stretch>
-            <a:fillRect/>
-          </a:stretch>
-        </p:blipFill>
-        <p:spPr>
-          <a:xfrm>
-            <a:off x="9249239" y="3197879"/>
-            <a:ext cx="2075946" cy="3481762"/>
-          </a:xfrm>
-          <a:prstGeom prst="rect">
-            <a:avLst/>
-          </a:prstGeom>
-        </p:spPr>
-      </p:pic>
-      <p:pic>
-        <p:nvPicPr>
-          <p:cNvPr id="7" name="Picture 6">
-            <a:extLst>
-              <a:ext uri="{FF2B5EF4-FFF2-40B4-BE49-F238E27FC236}">
-                <a16:creationId xmlns:a16="http://schemas.microsoft.com/office/drawing/2014/main" id="{EC0ADC01-E3E5-7310-7645-36804F758533}"/>
-              </a:ext>
-            </a:extLst>
-          </p:cNvPr>
-          <p:cNvPicPr>
-            <a:picLocks noChangeAspect="1"/>
-          </p:cNvPicPr>
-          <p:nvPr/>
-        </p:nvPicPr>
-        <p:blipFill>
-          <a:blip r:embed="rId3"/>
-          <a:stretch>
-            <a:fillRect/>
-          </a:stretch>
-        </p:blipFill>
-        <p:spPr>
-          <a:xfrm>
-            <a:off x="866815" y="3219566"/>
-            <a:ext cx="1629684" cy="3438387"/>
-          </a:xfrm>
-          <a:prstGeom prst="rect">
-            <a:avLst/>
-          </a:prstGeom>
-        </p:spPr>
-      </p:pic>
-      <p:pic>
-        <p:nvPicPr>
-          <p:cNvPr id="10" name="Picture 9" descr="Shape, square&#10;&#10;Description automatically generated">
-            <a:extLst>
-              <a:ext uri="{FF2B5EF4-FFF2-40B4-BE49-F238E27FC236}">
-                <a16:creationId xmlns:a16="http://schemas.microsoft.com/office/drawing/2014/main" id="{5B894B71-1D28-1D10-0F60-DCB8F8C3B6A4}"/>
-              </a:ext>
-            </a:extLst>
-          </p:cNvPr>
-          <p:cNvPicPr>
-            <a:picLocks noChangeAspect="1"/>
-          </p:cNvPicPr>
-          <p:nvPr/>
-        </p:nvPicPr>
-        <p:blipFill>
-          <a:blip r:embed="rId4"/>
-          <a:stretch>
-            <a:fillRect/>
-          </a:stretch>
-        </p:blipFill>
-        <p:spPr>
-          <a:xfrm>
-            <a:off x="4278426" y="1159431"/>
-            <a:ext cx="3879354" cy="4959904"/>
-          </a:xfrm>
-          <a:prstGeom prst="rect">
-            <a:avLst/>
-          </a:prstGeom>
-        </p:spPr>
-      </p:pic>
-      <p:sp>
-        <p:nvSpPr>
-          <p:cNvPr id="11" name="TextBox 10">
-            <a:extLst>
-              <a:ext uri="{FF2B5EF4-FFF2-40B4-BE49-F238E27FC236}">
-                <a16:creationId xmlns:a16="http://schemas.microsoft.com/office/drawing/2014/main" id="{B5C40031-C630-672A-E0AA-C39FB2531D02}"/>
-              </a:ext>
-            </a:extLst>
-          </p:cNvPr>
-          <p:cNvSpPr txBox="1"/>
-          <p:nvPr/>
-        </p:nvSpPr>
-        <p:spPr>
-          <a:xfrm>
-            <a:off x="4600574" y="1514474"/>
-            <a:ext cx="3178969" cy="954107"/>
-          </a:xfrm>
-          <a:prstGeom prst="rect">
-            <a:avLst/>
-          </a:prstGeom>
-          <a:noFill/>
-        </p:spPr>
-        <p:txBody>
-          <a:bodyPr wrap="square" rtlCol="0">
-            <a:spAutoFit/>
-          </a:bodyPr>
-          <a:lstStyle/>
-          <a:p>
-            <a:r>
-              <a:rPr lang="de-DE" sz="2800" dirty="0">
-                <a:latin typeface="Cavolini" panose="020B0604020202020204" pitchFamily="34" charset="0"/>
-                <a:cs typeface="Cavolini" panose="020B0604020202020204" pitchFamily="34" charset="0"/>
-              </a:rPr>
-              <a:t>Datenmanage-</a:t>
-            </a:r>
-            <a:r>
-              <a:rPr lang="de-DE" sz="2800" dirty="0" err="1">
-                <a:latin typeface="Cavolini" panose="020B0604020202020204" pitchFamily="34" charset="0"/>
-                <a:cs typeface="Cavolini" panose="020B0604020202020204" pitchFamily="34" charset="0"/>
-              </a:rPr>
-              <a:t>mentplan</a:t>
-            </a:r>
-            <a:endParaRPr lang="de-DE" sz="2800" dirty="0">
-              <a:latin typeface="Cavolini" panose="020B0604020202020204" pitchFamily="34" charset="0"/>
-              <a:cs typeface="Cavolini" panose="020B0604020202020204" pitchFamily="34" charset="0"/>
-            </a:endParaRPr>
-          </a:p>
-        </p:txBody>
-      </p:sp>
-      <p:sp>
-        <p:nvSpPr>
-          <p:cNvPr id="12" name="TextBox 11">
-            <a:extLst>
-              <a:ext uri="{FF2B5EF4-FFF2-40B4-BE49-F238E27FC236}">
-                <a16:creationId xmlns:a16="http://schemas.microsoft.com/office/drawing/2014/main" id="{2BB64B5D-C6B6-C951-C6AA-0B83943023D8}"/>
-              </a:ext>
-            </a:extLst>
-          </p:cNvPr>
-          <p:cNvSpPr txBox="1"/>
-          <p:nvPr/>
-        </p:nvSpPr>
-        <p:spPr>
-          <a:xfrm>
-            <a:off x="4640801" y="2823624"/>
-            <a:ext cx="2464136" cy="2787366"/>
-          </a:xfrm>
-          <a:prstGeom prst="rect">
-            <a:avLst/>
-          </a:prstGeom>
-          <a:noFill/>
-        </p:spPr>
-        <p:txBody>
-          <a:bodyPr wrap="none" rtlCol="0">
-            <a:spAutoFit/>
-          </a:bodyPr>
-          <a:lstStyle/>
-          <a:p>
-            <a:pPr marL="285750" indent="-285750">
-              <a:lnSpc>
-                <a:spcPct val="200000"/>
-              </a:lnSpc>
-              <a:buFontTx/>
-              <a:buChar char="-"/>
-            </a:pPr>
-            <a:r>
-              <a:rPr lang="de-DE" dirty="0">
-                <a:latin typeface="Cavolini" panose="020B0604020202020204" pitchFamily="34" charset="0"/>
-                <a:cs typeface="Cavolini" panose="020B0604020202020204" pitchFamily="34" charset="0"/>
-              </a:rPr>
-              <a:t>Durchführender</a:t>
-            </a:r>
-          </a:p>
-          <a:p>
-            <a:pPr marL="285750" indent="-285750">
-              <a:lnSpc>
-                <a:spcPct val="200000"/>
-              </a:lnSpc>
-              <a:buFontTx/>
-              <a:buChar char="-"/>
-            </a:pPr>
-            <a:r>
-              <a:rPr lang="de-DE" dirty="0">
-                <a:latin typeface="Cavolini" panose="020B0604020202020204" pitchFamily="34" charset="0"/>
-                <a:cs typeface="Cavolini" panose="020B0604020202020204" pitchFamily="34" charset="0"/>
-              </a:rPr>
-              <a:t>Name</a:t>
-            </a:r>
-          </a:p>
-          <a:p>
-            <a:pPr marL="285750" indent="-285750">
-              <a:lnSpc>
-                <a:spcPct val="200000"/>
-              </a:lnSpc>
-              <a:buFontTx/>
-              <a:buChar char="-"/>
-            </a:pPr>
-            <a:r>
-              <a:rPr lang="de-DE" dirty="0">
-                <a:latin typeface="Cavolini" panose="020B0604020202020204" pitchFamily="34" charset="0"/>
-                <a:cs typeface="Cavolini" panose="020B0604020202020204" pitchFamily="34" charset="0"/>
-              </a:rPr>
-              <a:t>Ziel</a:t>
-            </a:r>
-          </a:p>
-          <a:p>
-            <a:pPr marL="285750" indent="-285750">
-              <a:lnSpc>
-                <a:spcPct val="200000"/>
-              </a:lnSpc>
-              <a:buFontTx/>
-              <a:buChar char="-"/>
-            </a:pPr>
-            <a:r>
-              <a:rPr lang="de-DE" dirty="0">
-                <a:latin typeface="Cavolini" panose="020B0604020202020204" pitchFamily="34" charset="0"/>
-                <a:cs typeface="Cavolini" panose="020B0604020202020204" pitchFamily="34" charset="0"/>
-              </a:rPr>
-              <a:t>Datenquelle</a:t>
-            </a:r>
-          </a:p>
-          <a:p>
-            <a:pPr marL="285750" indent="-285750">
-              <a:lnSpc>
-                <a:spcPct val="200000"/>
-              </a:lnSpc>
-              <a:buFontTx/>
-              <a:buChar char="-"/>
-            </a:pPr>
-            <a:r>
-              <a:rPr lang="de-DE" dirty="0">
-                <a:latin typeface="Cavolini" panose="020B0604020202020204" pitchFamily="34" charset="0"/>
-                <a:cs typeface="Cavolini" panose="020B0604020202020204" pitchFamily="34" charset="0"/>
-              </a:rPr>
-              <a:t>Archivierung</a:t>
-            </a:r>
-          </a:p>
-        </p:txBody>
-      </p:sp>
-    </p:spTree>
-    <p:extLst>
-      <p:ext uri="{BB962C8B-B14F-4D97-AF65-F5344CB8AC3E}">
-        <p14:creationId xmlns:p14="http://schemas.microsoft.com/office/powerpoint/2010/main" val="1248021528"/>
-      </p:ext>
-    </p:extLst>
-  </p:cSld>
-  <p:clrMapOvr>
-    <a:masterClrMapping/>
-  </p:clrMapOvr>
-  <p:timing>
-    <p:tnLst>
-      <p:par>
-        <p:cTn id="1" dur="indefinite" restart="never" nodeType="tmRoot">
-          <p:childTnLst>
-            <p:seq concurrent="1" nextAc="seek">
-              <p:cTn id="2" dur="indefinite" nodeType="mainSeq">
-                <p:childTnLst>
-                  <p:par>
-                    <p:cTn id="3" fill="hold">
-                      <p:stCondLst>
-                        <p:cond delay="indefinite"/>
-                      </p:stCondLst>
-                      <p:childTnLst>
-                        <p:par>
-                          <p:cTn id="4" fill="hold">
-                            <p:stCondLst>
-                              <p:cond delay="0"/>
-                            </p:stCondLst>
-                            <p:childTnLst>
-                              <p:par>
-                                <p:cTn id="5" presetID="1" presetClass="entr" presetSubtype="0" fill="hold" grpId="0" nodeType="clickEffect">
-                                  <p:stCondLst>
-                                    <p:cond delay="0"/>
-                                  </p:stCondLst>
-                                  <p:childTnLst>
-                                    <p:set>
-                                      <p:cBhvr>
-                                        <p:cTn id="6" dur="1" fill="hold">
-                                          <p:stCondLst>
-                                            <p:cond delay="0"/>
-                                          </p:stCondLst>
-                                        </p:cTn>
-                                        <p:tgtEl>
-                                          <p:spTgt spid="12">
-                                            <p:txEl>
-                                              <p:pRg st="0" end="0"/>
-                                            </p:txEl>
-                                          </p:spTgt>
-                                        </p:tgtEl>
-                                        <p:attrNameLst>
-                                          <p:attrName>style.visibility</p:attrName>
-                                        </p:attrNameLst>
-                                      </p:cBhvr>
-                                      <p:to>
-                                        <p:strVal val="visible"/>
-                                      </p:to>
-                                    </p:set>
-                                  </p:childTnLst>
-                                </p:cTn>
-                              </p:par>
-                            </p:childTnLst>
-                          </p:cTn>
-                        </p:par>
-                      </p:childTnLst>
-                    </p:cTn>
-                  </p:par>
-                  <p:par>
-                    <p:cTn id="7" fill="hold">
-                      <p:stCondLst>
-                        <p:cond delay="indefinite"/>
-                      </p:stCondLst>
-                      <p:childTnLst>
-                        <p:par>
-                          <p:cTn id="8" fill="hold">
-                            <p:stCondLst>
-                              <p:cond delay="0"/>
-                            </p:stCondLst>
-                            <p:childTnLst>
-                              <p:par>
-                                <p:cTn id="9" presetID="1" presetClass="entr" presetSubtype="0" fill="hold" grpId="0" nodeType="clickEffect">
-                                  <p:stCondLst>
-                                    <p:cond delay="0"/>
-                                  </p:stCondLst>
-                                  <p:childTnLst>
-                                    <p:set>
-                                      <p:cBhvr>
-                                        <p:cTn id="10" dur="1" fill="hold">
-                                          <p:stCondLst>
-                                            <p:cond delay="0"/>
-                                          </p:stCondLst>
-                                        </p:cTn>
-                                        <p:tgtEl>
-                                          <p:spTgt spid="12">
-                                            <p:txEl>
-                                              <p:pRg st="1" end="1"/>
-                                            </p:txEl>
-                                          </p:spTgt>
-                                        </p:tgtEl>
-                                        <p:attrNameLst>
-                                          <p:attrName>style.visibility</p:attrName>
-                                        </p:attrNameLst>
-                                      </p:cBhvr>
-                                      <p:to>
-                                        <p:strVal val="visible"/>
-                                      </p:to>
-                                    </p:set>
-                                  </p:childTnLst>
-                                </p:cTn>
-                              </p:par>
-                            </p:childTnLst>
-                          </p:cTn>
-                        </p:par>
-                      </p:childTnLst>
-                    </p:cTn>
-                  </p:par>
-                  <p:par>
-                    <p:cTn id="11" fill="hold">
-                      <p:stCondLst>
-                        <p:cond delay="indefinite"/>
-                      </p:stCondLst>
-                      <p:childTnLst>
-                        <p:par>
-                          <p:cTn id="12" fill="hold">
-                            <p:stCondLst>
-                              <p:cond delay="0"/>
-                            </p:stCondLst>
-                            <p:childTnLst>
-                              <p:par>
-                                <p:cTn id="13" presetID="1" presetClass="entr" presetSubtype="0" fill="hold" grpId="0" nodeType="clickEffect">
-                                  <p:stCondLst>
-                                    <p:cond delay="0"/>
-                                  </p:stCondLst>
-                                  <p:childTnLst>
-                                    <p:set>
-                                      <p:cBhvr>
-                                        <p:cTn id="14" dur="1" fill="hold">
-                                          <p:stCondLst>
-                                            <p:cond delay="0"/>
-                                          </p:stCondLst>
-                                        </p:cTn>
-                                        <p:tgtEl>
-                                          <p:spTgt spid="12">
-                                            <p:txEl>
-                                              <p:pRg st="2" end="2"/>
-                                            </p:txEl>
-                                          </p:spTgt>
-                                        </p:tgtEl>
-                                        <p:attrNameLst>
-                                          <p:attrName>style.visibility</p:attrName>
-                                        </p:attrNameLst>
-                                      </p:cBhvr>
-                                      <p:to>
-                                        <p:strVal val="visible"/>
-                                      </p:to>
-                                    </p:set>
-                                  </p:childTnLst>
-                                </p:cTn>
-                              </p:par>
-                            </p:childTnLst>
-                          </p:cTn>
-                        </p:par>
-                      </p:childTnLst>
-                    </p:cTn>
-                  </p:par>
-                  <p:par>
-                    <p:cTn id="15" fill="hold">
-                      <p:stCondLst>
-                        <p:cond delay="indefinite"/>
-                      </p:stCondLst>
-                      <p:childTnLst>
-                        <p:par>
-                          <p:cTn id="16" fill="hold">
-                            <p:stCondLst>
-                              <p:cond delay="0"/>
-                            </p:stCondLst>
-                            <p:childTnLst>
-                              <p:par>
-                                <p:cTn id="17" presetID="1" presetClass="entr" presetSubtype="0" fill="hold" grpId="0" nodeType="clickEffect">
-                                  <p:stCondLst>
-                                    <p:cond delay="0"/>
-                                  </p:stCondLst>
-                                  <p:childTnLst>
-                                    <p:set>
-                                      <p:cBhvr>
-                                        <p:cTn id="18" dur="1" fill="hold">
-                                          <p:stCondLst>
-                                            <p:cond delay="0"/>
-                                          </p:stCondLst>
-                                        </p:cTn>
-                                        <p:tgtEl>
-                                          <p:spTgt spid="12">
-                                            <p:txEl>
-                                              <p:pRg st="3" end="3"/>
-                                            </p:txEl>
-                                          </p:spTgt>
-                                        </p:tgtEl>
-                                        <p:attrNameLst>
-                                          <p:attrName>style.visibility</p:attrName>
-                                        </p:attrNameLst>
-                                      </p:cBhvr>
-                                      <p:to>
-                                        <p:strVal val="visible"/>
-                                      </p:to>
-                                    </p:set>
-                                  </p:childTnLst>
-                                </p:cTn>
-                              </p:par>
-                            </p:childTnLst>
-                          </p:cTn>
-                        </p:par>
-                      </p:childTnLst>
-                    </p:cTn>
-                  </p:par>
-                  <p:par>
-                    <p:cTn id="19" fill="hold">
-                      <p:stCondLst>
-                        <p:cond delay="indefinite"/>
-                      </p:stCondLst>
-                      <p:childTnLst>
-                        <p:par>
-                          <p:cTn id="20" fill="hold">
-                            <p:stCondLst>
-                              <p:cond delay="0"/>
-                            </p:stCondLst>
-                            <p:childTnLst>
-                              <p:par>
-                                <p:cTn id="21" presetID="1" presetClass="entr" presetSubtype="0" fill="hold" grpId="0" nodeType="clickEffect">
-                                  <p:stCondLst>
-                                    <p:cond delay="0"/>
-                                  </p:stCondLst>
-                                  <p:childTnLst>
-                                    <p:set>
-                                      <p:cBhvr>
-                                        <p:cTn id="22" dur="1" fill="hold">
-                                          <p:stCondLst>
-                                            <p:cond delay="0"/>
-                                          </p:stCondLst>
-                                        </p:cTn>
-                                        <p:tgtEl>
-                                          <p:spTgt spid="12">
-                                            <p:txEl>
-                                              <p:pRg st="4" end="4"/>
-                                            </p:txEl>
-                                          </p:spTgt>
-                                        </p:tgtEl>
-                                        <p:attrNameLst>
-                                          <p:attrName>style.visibility</p:attrName>
-                                        </p:attrNameLst>
-                                      </p:cBhvr>
-                                      <p:to>
-                                        <p:strVal val="visible"/>
-                                      </p:to>
-                                    </p:set>
-                                  </p:childTnLst>
-                                </p:cTn>
-                              </p:par>
-                            </p:childTnLst>
-                          </p:cTn>
-                        </p:par>
-                      </p:childTnLst>
-                    </p:cTn>
-                  </p:par>
-                </p:childTnLst>
-              </p:cTn>
-              <p:prevCondLst>
-                <p:cond evt="onPrev" delay="0">
-                  <p:tgtEl>
-                    <p:sldTgt/>
-                  </p:tgtEl>
-                </p:cond>
-              </p:prevCondLst>
-              <p:nextCondLst>
-                <p:cond evt="onNext" delay="0">
-                  <p:tgtEl>
-                    <p:sldTgt/>
-                  </p:tgtEl>
-                </p:cond>
-              </p:nextCondLst>
-            </p:seq>
-          </p:childTnLst>
-        </p:cTn>
-      </p:par>
-    </p:tnLst>
-    <p:bldLst>
-      <p:bldP spid="12" grpId="0" build="p"/>
-    </p:bldLst>
-  </p:timing>
-</p:sld>
-</file>
-
 <file path=ppt/theme/theme1.xml><?xml version="1.0" encoding="utf-8"?>
 <a:theme xmlns:a="http://schemas.openxmlformats.org/drawingml/2006/main" name="Office Theme">
   <a:themeElements>

</xml_diff>